<commit_message>
Artifacts for simplified version
</commit_message>
<xml_diff>
--- a/Documentation/Temporal Qualities.pptx
+++ b/Documentation/Temporal Qualities.pptx
@@ -5,7 +5,7 @@
     <p:sldMasterId id="2147483648" r:id="rId1"/>
   </p:sldMasterIdLst>
   <p:notesMasterIdLst>
-    <p:notesMasterId r:id="rId9"/>
+    <p:notesMasterId r:id="rId14"/>
   </p:notesMasterIdLst>
   <p:sldIdLst>
     <p:sldId id="256" r:id="rId2"/>
@@ -15,6 +15,11 @@
     <p:sldId id="594" r:id="rId6"/>
     <p:sldId id="596" r:id="rId7"/>
     <p:sldId id="597" r:id="rId8"/>
+    <p:sldId id="602" r:id="rId9"/>
+    <p:sldId id="598" r:id="rId10"/>
+    <p:sldId id="599" r:id="rId11"/>
+    <p:sldId id="600" r:id="rId12"/>
+    <p:sldId id="601" r:id="rId13"/>
   </p:sldIdLst>
   <p:sldSz cx="12192000" cy="6858000"/>
   <p:notesSz cx="6858000" cy="9144000"/>
@@ -203,7 +208,7 @@
           <a:p>
             <a:fld id="{A2488B8E-7323-4FF1-A5B0-F20D7E9A9FEB}" type="datetimeFigureOut">
               <a:rPr lang="en-US" smtClean="0"/>
-              <a:t>1/24/2021</a:t>
+              <a:t>1/26/2021</a:t>
             </a:fld>
             <a:endParaRPr lang="en-US"/>
           </a:p>
@@ -617,7 +622,7 @@
           <a:p>
             <a:fld id="{867FABA3-ED0B-4261-91FE-267A5EF94074}" type="datetimeFigureOut">
               <a:rPr lang="en-US" smtClean="0"/>
-              <a:t>1/24/2021</a:t>
+              <a:t>1/26/2021</a:t>
             </a:fld>
             <a:endParaRPr lang="en-US" dirty="0"/>
           </a:p>
@@ -815,7 +820,7 @@
           <a:p>
             <a:fld id="{867FABA3-ED0B-4261-91FE-267A5EF94074}" type="datetimeFigureOut">
               <a:rPr lang="en-US" smtClean="0"/>
-              <a:t>1/24/2021</a:t>
+              <a:t>1/26/2021</a:t>
             </a:fld>
             <a:endParaRPr lang="en-US" dirty="0"/>
           </a:p>
@@ -1023,7 +1028,7 @@
           <a:p>
             <a:fld id="{867FABA3-ED0B-4261-91FE-267A5EF94074}" type="datetimeFigureOut">
               <a:rPr lang="en-US" smtClean="0"/>
-              <a:t>1/24/2021</a:t>
+              <a:t>1/26/2021</a:t>
             </a:fld>
             <a:endParaRPr lang="en-US" dirty="0"/>
           </a:p>
@@ -1221,7 +1226,7 @@
           <a:p>
             <a:fld id="{867FABA3-ED0B-4261-91FE-267A5EF94074}" type="datetimeFigureOut">
               <a:rPr lang="en-US" smtClean="0"/>
-              <a:t>1/24/2021</a:t>
+              <a:t>1/26/2021</a:t>
             </a:fld>
             <a:endParaRPr lang="en-US" dirty="0"/>
           </a:p>
@@ -1496,7 +1501,7 @@
           <a:p>
             <a:fld id="{867FABA3-ED0B-4261-91FE-267A5EF94074}" type="datetimeFigureOut">
               <a:rPr lang="en-US" smtClean="0"/>
-              <a:t>1/24/2021</a:t>
+              <a:t>1/26/2021</a:t>
             </a:fld>
             <a:endParaRPr lang="en-US" dirty="0"/>
           </a:p>
@@ -1761,7 +1766,7 @@
           <a:p>
             <a:fld id="{867FABA3-ED0B-4261-91FE-267A5EF94074}" type="datetimeFigureOut">
               <a:rPr lang="en-US" smtClean="0"/>
-              <a:t>1/24/2021</a:t>
+              <a:t>1/26/2021</a:t>
             </a:fld>
             <a:endParaRPr lang="en-US" dirty="0"/>
           </a:p>
@@ -2173,7 +2178,7 @@
           <a:p>
             <a:fld id="{867FABA3-ED0B-4261-91FE-267A5EF94074}" type="datetimeFigureOut">
               <a:rPr lang="en-US" smtClean="0"/>
-              <a:t>1/24/2021</a:t>
+              <a:t>1/26/2021</a:t>
             </a:fld>
             <a:endParaRPr lang="en-US" dirty="0"/>
           </a:p>
@@ -2314,7 +2319,7 @@
           <a:p>
             <a:fld id="{867FABA3-ED0B-4261-91FE-267A5EF94074}" type="datetimeFigureOut">
               <a:rPr lang="en-US" smtClean="0"/>
-              <a:t>1/24/2021</a:t>
+              <a:t>1/26/2021</a:t>
             </a:fld>
             <a:endParaRPr lang="en-US" dirty="0"/>
           </a:p>
@@ -2427,7 +2432,7 @@
           <a:p>
             <a:fld id="{867FABA3-ED0B-4261-91FE-267A5EF94074}" type="datetimeFigureOut">
               <a:rPr lang="en-US" smtClean="0"/>
-              <a:t>1/24/2021</a:t>
+              <a:t>1/26/2021</a:t>
             </a:fld>
             <a:endParaRPr lang="en-US" dirty="0"/>
           </a:p>
@@ -2738,7 +2743,7 @@
           <a:p>
             <a:fld id="{867FABA3-ED0B-4261-91FE-267A5EF94074}" type="datetimeFigureOut">
               <a:rPr lang="en-US" smtClean="0"/>
-              <a:t>1/24/2021</a:t>
+              <a:t>1/26/2021</a:t>
             </a:fld>
             <a:endParaRPr lang="en-US" dirty="0"/>
           </a:p>
@@ -3026,7 +3031,7 @@
           <a:p>
             <a:fld id="{867FABA3-ED0B-4261-91FE-267A5EF94074}" type="datetimeFigureOut">
               <a:rPr lang="en-US" smtClean="0"/>
-              <a:t>1/24/2021</a:t>
+              <a:t>1/26/2021</a:t>
             </a:fld>
             <a:endParaRPr lang="en-US" dirty="0"/>
           </a:p>
@@ -3267,7 +3272,7 @@
           <a:p>
             <a:fld id="{867FABA3-ED0B-4261-91FE-267A5EF94074}" type="datetimeFigureOut">
               <a:rPr lang="en-US" smtClean="0"/>
-              <a:t>1/24/2021</a:t>
+              <a:t>1/26/2021</a:t>
             </a:fld>
             <a:endParaRPr lang="en-US" dirty="0"/>
           </a:p>
@@ -3799,6 +3804,390 @@
 </p:sld>
 </file>
 
+<file path=ppt/slides/slide10.xml><?xml version="1.0" encoding="utf-8"?>
+<p:sld xmlns:a="http://schemas.openxmlformats.org/drawingml/2006/main" xmlns:r="http://schemas.openxmlformats.org/officeDocument/2006/relationships" xmlns:p="http://schemas.openxmlformats.org/presentationml/2006/main">
+  <p:cSld>
+    <p:spTree>
+      <p:nvGrpSpPr>
+        <p:cNvPr id="1" name=""/>
+        <p:cNvGrpSpPr/>
+        <p:nvPr/>
+      </p:nvGrpSpPr>
+      <p:grpSpPr>
+        <a:xfrm>
+          <a:off x="0" y="0"/>
+          <a:ext cx="0" cy="0"/>
+          <a:chOff x="0" y="0"/>
+          <a:chExt cx="0" cy="0"/>
+        </a:xfrm>
+      </p:grpSpPr>
+      <p:pic>
+        <p:nvPicPr>
+          <p:cNvPr id="16" name="Picture 15">
+            <a:extLst>
+              <a:ext uri="{FF2B5EF4-FFF2-40B4-BE49-F238E27FC236}">
+                <a16:creationId xmlns:a16="http://schemas.microsoft.com/office/drawing/2014/main" id="{C44B5019-F379-46FE-9436-0615D1C201A4}"/>
+              </a:ext>
+            </a:extLst>
+          </p:cNvPr>
+          <p:cNvPicPr>
+            <a:picLocks noChangeAspect="1"/>
+          </p:cNvPicPr>
+          <p:nvPr/>
+        </p:nvPicPr>
+        <p:blipFill>
+          <a:blip r:embed="rId2"/>
+          <a:stretch>
+            <a:fillRect/>
+          </a:stretch>
+        </p:blipFill>
+        <p:spPr>
+          <a:xfrm>
+            <a:off x="1552309" y="0"/>
+            <a:ext cx="9087381" cy="6858000"/>
+          </a:xfrm>
+          <a:prstGeom prst="rect">
+            <a:avLst/>
+          </a:prstGeom>
+        </p:spPr>
+      </p:pic>
+      <p:sp>
+        <p:nvSpPr>
+          <p:cNvPr id="9" name="Speech Bubble: Rectangle with Corners Rounded 8">
+            <a:extLst>
+              <a:ext uri="{FF2B5EF4-FFF2-40B4-BE49-F238E27FC236}">
+                <a16:creationId xmlns:a16="http://schemas.microsoft.com/office/drawing/2014/main" id="{94C5111E-5306-4D16-9F46-232676075103}"/>
+              </a:ext>
+            </a:extLst>
+          </p:cNvPr>
+          <p:cNvSpPr/>
+          <p:nvPr/>
+        </p:nvSpPr>
+        <p:spPr>
+          <a:xfrm>
+            <a:off x="7713822" y="4046074"/>
+            <a:ext cx="760219" cy="398834"/>
+          </a:xfrm>
+          <a:prstGeom prst="wedgeRoundRectCallout">
+            <a:avLst>
+              <a:gd name="adj1" fmla="val 60024"/>
+              <a:gd name="adj2" fmla="val 85417"/>
+              <a:gd name="adj3" fmla="val 16667"/>
+            </a:avLst>
+          </a:prstGeom>
+        </p:spPr>
+        <p:style>
+          <a:lnRef idx="2">
+            <a:schemeClr val="accent1">
+              <a:shade val="50000"/>
+            </a:schemeClr>
+          </a:lnRef>
+          <a:fillRef idx="1">
+            <a:schemeClr val="accent1"/>
+          </a:fillRef>
+          <a:effectRef idx="0">
+            <a:schemeClr val="accent1"/>
+          </a:effectRef>
+          <a:fontRef idx="minor">
+            <a:schemeClr val="lt1"/>
+          </a:fontRef>
+        </p:style>
+        <p:txBody>
+          <a:bodyPr rtlCol="0" anchor="ctr"/>
+          <a:lstStyle/>
+          <a:p>
+            <a:pPr algn="ctr"/>
+            <a:r>
+              <a:rPr lang="en-US" sz="1200" dirty="0"/>
+              <a:t>Needs work</a:t>
+            </a:r>
+          </a:p>
+        </p:txBody>
+      </p:sp>
+      <p:sp>
+        <p:nvSpPr>
+          <p:cNvPr id="10" name="Speech Bubble: Rectangle with Corners Rounded 9">
+            <a:extLst>
+              <a:ext uri="{FF2B5EF4-FFF2-40B4-BE49-F238E27FC236}">
+                <a16:creationId xmlns:a16="http://schemas.microsoft.com/office/drawing/2014/main" id="{D655F85D-C1D6-4773-8E88-EA7196A51899}"/>
+              </a:ext>
+            </a:extLst>
+          </p:cNvPr>
+          <p:cNvSpPr/>
+          <p:nvPr/>
+        </p:nvSpPr>
+        <p:spPr>
+          <a:xfrm>
+            <a:off x="5210783" y="3030166"/>
+            <a:ext cx="760219" cy="398834"/>
+          </a:xfrm>
+          <a:prstGeom prst="wedgeRoundRectCallout">
+            <a:avLst>
+              <a:gd name="adj1" fmla="val 47228"/>
+              <a:gd name="adj2" fmla="val 141515"/>
+              <a:gd name="adj3" fmla="val 16667"/>
+            </a:avLst>
+          </a:prstGeom>
+        </p:spPr>
+        <p:style>
+          <a:lnRef idx="2">
+            <a:schemeClr val="accent1">
+              <a:shade val="50000"/>
+            </a:schemeClr>
+          </a:lnRef>
+          <a:fillRef idx="1">
+            <a:schemeClr val="accent1"/>
+          </a:fillRef>
+          <a:effectRef idx="0">
+            <a:schemeClr val="accent1"/>
+          </a:effectRef>
+          <a:fontRef idx="minor">
+            <a:schemeClr val="lt1"/>
+          </a:fontRef>
+        </p:style>
+        <p:txBody>
+          <a:bodyPr rtlCol="0" anchor="ctr"/>
+          <a:lstStyle/>
+          <a:p>
+            <a:pPr algn="ctr"/>
+            <a:r>
+              <a:rPr lang="en-US" sz="1200" dirty="0"/>
+              <a:t>Thinking about</a:t>
+            </a:r>
+          </a:p>
+        </p:txBody>
+      </p:sp>
+      <p:sp>
+        <p:nvSpPr>
+          <p:cNvPr id="17" name="TextBox 16">
+            <a:extLst>
+              <a:ext uri="{FF2B5EF4-FFF2-40B4-BE49-F238E27FC236}">
+                <a16:creationId xmlns:a16="http://schemas.microsoft.com/office/drawing/2014/main" id="{1E5ED116-08D4-420F-9290-3C8499906B87}"/>
+              </a:ext>
+            </a:extLst>
+          </p:cNvPr>
+          <p:cNvSpPr txBox="1"/>
+          <p:nvPr/>
+        </p:nvSpPr>
+        <p:spPr>
+          <a:xfrm rot="16200000">
+            <a:off x="-960527" y="3198168"/>
+            <a:ext cx="3005246" cy="461665"/>
+          </a:xfrm>
+          <a:prstGeom prst="rect">
+            <a:avLst/>
+          </a:prstGeom>
+          <a:noFill/>
+        </p:spPr>
+        <p:txBody>
+          <a:bodyPr wrap="none" rtlCol="0">
+            <a:spAutoFit/>
+          </a:bodyPr>
+          <a:lstStyle/>
+          <a:p>
+            <a:r>
+              <a:rPr lang="en-US" sz="2400" dirty="0"/>
+              <a:t>UML Instance Diagram</a:t>
+            </a:r>
+          </a:p>
+        </p:txBody>
+      </p:sp>
+    </p:spTree>
+    <p:extLst>
+      <p:ext uri="{BB962C8B-B14F-4D97-AF65-F5344CB8AC3E}">
+        <p14:creationId xmlns:p14="http://schemas.microsoft.com/office/powerpoint/2010/main" val="934842067"/>
+      </p:ext>
+    </p:extLst>
+  </p:cSld>
+  <p:clrMapOvr>
+    <a:masterClrMapping/>
+  </p:clrMapOvr>
+</p:sld>
+</file>
+
+<file path=ppt/slides/slide11.xml><?xml version="1.0" encoding="utf-8"?>
+<p:sld xmlns:a="http://schemas.openxmlformats.org/drawingml/2006/main" xmlns:r="http://schemas.openxmlformats.org/officeDocument/2006/relationships" xmlns:p="http://schemas.openxmlformats.org/presentationml/2006/main">
+  <p:cSld>
+    <p:spTree>
+      <p:nvGrpSpPr>
+        <p:cNvPr id="1" name=""/>
+        <p:cNvGrpSpPr/>
+        <p:nvPr/>
+      </p:nvGrpSpPr>
+      <p:grpSpPr>
+        <a:xfrm>
+          <a:off x="0" y="0"/>
+          <a:ext cx="0" cy="0"/>
+          <a:chOff x="0" y="0"/>
+          <a:chExt cx="0" cy="0"/>
+        </a:xfrm>
+      </p:grpSpPr>
+      <p:pic>
+        <p:nvPicPr>
+          <p:cNvPr id="3" name="Picture 2">
+            <a:extLst>
+              <a:ext uri="{FF2B5EF4-FFF2-40B4-BE49-F238E27FC236}">
+                <a16:creationId xmlns:a16="http://schemas.microsoft.com/office/drawing/2014/main" id="{C98D5E90-3920-4254-8E13-34ADD35DE7D0}"/>
+              </a:ext>
+            </a:extLst>
+          </p:cNvPr>
+          <p:cNvPicPr>
+            <a:picLocks noChangeAspect="1"/>
+          </p:cNvPicPr>
+          <p:nvPr/>
+        </p:nvPicPr>
+        <p:blipFill>
+          <a:blip r:embed="rId2"/>
+          <a:stretch>
+            <a:fillRect/>
+          </a:stretch>
+        </p:blipFill>
+        <p:spPr>
+          <a:xfrm>
+            <a:off x="814031" y="0"/>
+            <a:ext cx="10563938" cy="6858000"/>
+          </a:xfrm>
+          <a:prstGeom prst="rect">
+            <a:avLst/>
+          </a:prstGeom>
+        </p:spPr>
+      </p:pic>
+      <p:sp>
+        <p:nvSpPr>
+          <p:cNvPr id="4" name="TextBox 3">
+            <a:extLst>
+              <a:ext uri="{FF2B5EF4-FFF2-40B4-BE49-F238E27FC236}">
+                <a16:creationId xmlns:a16="http://schemas.microsoft.com/office/drawing/2014/main" id="{16F8AC6D-5D13-4811-9DE4-A64C7C7FE29D}"/>
+              </a:ext>
+            </a:extLst>
+          </p:cNvPr>
+          <p:cNvSpPr txBox="1"/>
+          <p:nvPr/>
+        </p:nvSpPr>
+        <p:spPr>
+          <a:xfrm rot="16200000">
+            <a:off x="-917019" y="3198168"/>
+            <a:ext cx="2918235" cy="461665"/>
+          </a:xfrm>
+          <a:prstGeom prst="rect">
+            <a:avLst/>
+          </a:prstGeom>
+          <a:noFill/>
+        </p:spPr>
+        <p:txBody>
+          <a:bodyPr wrap="none" rtlCol="0">
+            <a:spAutoFit/>
+          </a:bodyPr>
+          <a:lstStyle/>
+          <a:p>
+            <a:r>
+              <a:rPr lang="en-US" sz="2400" dirty="0"/>
+              <a:t>UML Model Fragment</a:t>
+            </a:r>
+          </a:p>
+        </p:txBody>
+      </p:sp>
+    </p:spTree>
+    <p:extLst>
+      <p:ext uri="{BB962C8B-B14F-4D97-AF65-F5344CB8AC3E}">
+        <p14:creationId xmlns:p14="http://schemas.microsoft.com/office/powerpoint/2010/main" val="462578855"/>
+      </p:ext>
+    </p:extLst>
+  </p:cSld>
+  <p:clrMapOvr>
+    <a:masterClrMapping/>
+  </p:clrMapOvr>
+</p:sld>
+</file>
+
+<file path=ppt/slides/slide12.xml><?xml version="1.0" encoding="utf-8"?>
+<p:sld xmlns:a="http://schemas.openxmlformats.org/drawingml/2006/main" xmlns:r="http://schemas.openxmlformats.org/officeDocument/2006/relationships" xmlns:p="http://schemas.openxmlformats.org/presentationml/2006/main">
+  <p:cSld>
+    <p:spTree>
+      <p:nvGrpSpPr>
+        <p:cNvPr id="1" name=""/>
+        <p:cNvGrpSpPr/>
+        <p:nvPr/>
+      </p:nvGrpSpPr>
+      <p:grpSpPr>
+        <a:xfrm>
+          <a:off x="0" y="0"/>
+          <a:ext cx="0" cy="0"/>
+          <a:chOff x="0" y="0"/>
+          <a:chExt cx="0" cy="0"/>
+        </a:xfrm>
+      </p:grpSpPr>
+      <p:pic>
+        <p:nvPicPr>
+          <p:cNvPr id="3" name="Picture 2">
+            <a:extLst>
+              <a:ext uri="{FF2B5EF4-FFF2-40B4-BE49-F238E27FC236}">
+                <a16:creationId xmlns:a16="http://schemas.microsoft.com/office/drawing/2014/main" id="{CC74E1D8-A6D6-4155-AFD5-39DF2FDD51DD}"/>
+              </a:ext>
+            </a:extLst>
+          </p:cNvPr>
+          <p:cNvPicPr>
+            <a:picLocks noChangeAspect="1"/>
+          </p:cNvPicPr>
+          <p:nvPr/>
+        </p:nvPicPr>
+        <p:blipFill>
+          <a:blip r:embed="rId2"/>
+          <a:stretch>
+            <a:fillRect/>
+          </a:stretch>
+        </p:blipFill>
+        <p:spPr>
+          <a:xfrm>
+            <a:off x="0" y="2128131"/>
+            <a:ext cx="12192000" cy="2601738"/>
+          </a:xfrm>
+          <a:prstGeom prst="rect">
+            <a:avLst/>
+          </a:prstGeom>
+        </p:spPr>
+      </p:pic>
+      <p:sp>
+        <p:nvSpPr>
+          <p:cNvPr id="4" name="Title 3">
+            <a:extLst>
+              <a:ext uri="{FF2B5EF4-FFF2-40B4-BE49-F238E27FC236}">
+                <a16:creationId xmlns:a16="http://schemas.microsoft.com/office/drawing/2014/main" id="{43362B71-32AD-43C4-9BC5-9310851994B0}"/>
+              </a:ext>
+            </a:extLst>
+          </p:cNvPr>
+          <p:cNvSpPr>
+            <a:spLocks noGrp="1"/>
+          </p:cNvSpPr>
+          <p:nvPr>
+            <p:ph type="title"/>
+          </p:nvPr>
+        </p:nvSpPr>
+        <p:spPr/>
+        <p:txBody>
+          <a:bodyPr/>
+          <a:lstStyle/>
+          <a:p>
+            <a:r>
+              <a:rPr lang="en-US" dirty="0"/>
+              <a:t>Qualities applied to vital signs</a:t>
+            </a:r>
+          </a:p>
+        </p:txBody>
+      </p:sp>
+    </p:spTree>
+    <p:extLst>
+      <p:ext uri="{BB962C8B-B14F-4D97-AF65-F5344CB8AC3E}">
+        <p14:creationId xmlns:p14="http://schemas.microsoft.com/office/powerpoint/2010/main" val="2089257019"/>
+      </p:ext>
+    </p:extLst>
+  </p:cSld>
+  <p:clrMapOvr>
+    <a:masterClrMapping/>
+  </p:clrMapOvr>
+</p:sld>
+</file>
+
 <file path=ppt/slides/slide2.xml><?xml version="1.0" encoding="utf-8"?>
 <p:sld xmlns:a="http://schemas.openxmlformats.org/drawingml/2006/main" xmlns:r="http://schemas.openxmlformats.org/officeDocument/2006/relationships" xmlns:p="http://schemas.openxmlformats.org/presentationml/2006/main">
   <p:cSld>
@@ -5966,10 +6355,10 @@
       </p:grpSpPr>
       <p:sp>
         <p:nvSpPr>
-          <p:cNvPr id="49" name="Rectangle 48">
-            <a:extLst>
-              <a:ext uri="{FF2B5EF4-FFF2-40B4-BE49-F238E27FC236}">
-                <a16:creationId xmlns:a16="http://schemas.microsoft.com/office/drawing/2014/main" id="{0E29895D-CA84-4CC1-8FB2-33A1F4038028}"/>
+          <p:cNvPr id="47" name="Rectangle 46">
+            <a:extLst>
+              <a:ext uri="{FF2B5EF4-FFF2-40B4-BE49-F238E27FC236}">
+                <a16:creationId xmlns:a16="http://schemas.microsoft.com/office/drawing/2014/main" id="{CFE3C31D-C0DC-43B3-9090-71A27EB1110D}"/>
               </a:ext>
             </a:extLst>
           </p:cNvPr>
@@ -5978,8 +6367,8 @@
         </p:nvSpPr>
         <p:spPr>
           <a:xfrm>
-            <a:off x="2035407" y="3044599"/>
-            <a:ext cx="2557181" cy="1699898"/>
+            <a:off x="6037240" y="4620783"/>
+            <a:ext cx="2484582" cy="2057390"/>
           </a:xfrm>
           <a:prstGeom prst="rect">
             <a:avLst/>
@@ -6012,16 +6401,19 @@
           <a:lstStyle/>
           <a:p>
             <a:pPr algn="ctr"/>
-            <a:endParaRPr lang="en-US"/>
-          </a:p>
-        </p:txBody>
-      </p:sp>
-      <p:sp>
-        <p:nvSpPr>
-          <p:cNvPr id="47" name="Rectangle 46">
-            <a:extLst>
-              <a:ext uri="{FF2B5EF4-FFF2-40B4-BE49-F238E27FC236}">
-                <a16:creationId xmlns:a16="http://schemas.microsoft.com/office/drawing/2014/main" id="{CFE3C31D-C0DC-43B3-9090-71A27EB1110D}"/>
+            <a:r>
+              <a:rPr lang="en-US" dirty="0"/>
+              <a:t>da</a:t>
+            </a:r>
+          </a:p>
+        </p:txBody>
+      </p:sp>
+      <p:sp>
+        <p:nvSpPr>
+          <p:cNvPr id="35" name="Rectangle 34">
+            <a:extLst>
+              <a:ext uri="{FF2B5EF4-FFF2-40B4-BE49-F238E27FC236}">
+                <a16:creationId xmlns:a16="http://schemas.microsoft.com/office/drawing/2014/main" id="{1945C638-82BC-40D9-8D64-12824887E631}"/>
               </a:ext>
             </a:extLst>
           </p:cNvPr>
@@ -6030,8 +6422,8 @@
         </p:nvSpPr>
         <p:spPr>
           <a:xfrm>
-            <a:off x="6037240" y="4620783"/>
-            <a:ext cx="2484582" cy="2057390"/>
+            <a:off x="9500799" y="1307586"/>
+            <a:ext cx="2484582" cy="1901409"/>
           </a:xfrm>
           <a:prstGeom prst="rect">
             <a:avLst/>
@@ -6064,19 +6456,51 @@
           <a:lstStyle/>
           <a:p>
             <a:pPr algn="ctr"/>
+            <a:endParaRPr lang="en-US"/>
+          </a:p>
+        </p:txBody>
+      </p:sp>
+      <p:sp>
+        <p:nvSpPr>
+          <p:cNvPr id="4" name="Title 3">
+            <a:extLst>
+              <a:ext uri="{FF2B5EF4-FFF2-40B4-BE49-F238E27FC236}">
+                <a16:creationId xmlns:a16="http://schemas.microsoft.com/office/drawing/2014/main" id="{A94A5FD9-49FD-4310-B87E-4EA3EEAB13AE}"/>
+              </a:ext>
+            </a:extLst>
+          </p:cNvPr>
+          <p:cNvSpPr>
+            <a:spLocks noGrp="1"/>
+          </p:cNvSpPr>
+          <p:nvPr>
+            <p:ph type="title"/>
+          </p:nvPr>
+        </p:nvSpPr>
+        <p:spPr>
+          <a:xfrm>
+            <a:off x="838200" y="365126"/>
+            <a:ext cx="10515600" cy="455958"/>
+          </a:xfrm>
+        </p:spPr>
+        <p:txBody>
+          <a:bodyPr>
+            <a:normAutofit fontScale="90000"/>
+          </a:bodyPr>
+          <a:lstStyle/>
+          <a:p>
             <a:r>
               <a:rPr lang="en-US" dirty="0"/>
-              <a:t>da</a:t>
-            </a:r>
-          </a:p>
-        </p:txBody>
-      </p:sp>
-      <p:sp>
-        <p:nvSpPr>
-          <p:cNvPr id="35" name="Rectangle 34">
-            <a:extLst>
-              <a:ext uri="{FF2B5EF4-FFF2-40B4-BE49-F238E27FC236}">
-                <a16:creationId xmlns:a16="http://schemas.microsoft.com/office/drawing/2014/main" id="{1945C638-82BC-40D9-8D64-12824887E631}"/>
+              <a:t>The measured temperature</a:t>
+            </a:r>
+          </a:p>
+        </p:txBody>
+      </p:sp>
+      <p:sp>
+        <p:nvSpPr>
+          <p:cNvPr id="6" name="Oval 5">
+            <a:extLst>
+              <a:ext uri="{FF2B5EF4-FFF2-40B4-BE49-F238E27FC236}">
+                <a16:creationId xmlns:a16="http://schemas.microsoft.com/office/drawing/2014/main" id="{D1C83E78-93F0-4E1D-9B8D-D40C561264B2}"/>
               </a:ext>
             </a:extLst>
           </p:cNvPr>
@@ -6085,18 +6509,12 @@
         </p:nvSpPr>
         <p:spPr>
           <a:xfrm>
-            <a:off x="9500799" y="1307586"/>
-            <a:ext cx="2484582" cy="1901409"/>
-          </a:xfrm>
-          <a:prstGeom prst="rect">
-            <a:avLst/>
-          </a:prstGeom>
-          <a:solidFill>
-            <a:schemeClr val="accent1">
-              <a:lumMod val="20000"/>
-              <a:lumOff val="80000"/>
-            </a:schemeClr>
-          </a:solidFill>
+            <a:off x="9630731" y="1534059"/>
+            <a:ext cx="2224718" cy="1298377"/>
+          </a:xfrm>
+          <a:prstGeom prst="ellipse">
+            <a:avLst/>
+          </a:prstGeom>
         </p:spPr>
         <p:style>
           <a:lnRef idx="2">
@@ -6115,55 +6533,39 @@
           </a:fontRef>
         </p:style>
         <p:txBody>
-          <a:bodyPr rtlCol="0" anchor="ctr"/>
+          <a:bodyPr wrap="square" rtlCol="0" anchor="ctr">
+            <a:spAutoFit/>
+          </a:bodyPr>
           <a:lstStyle/>
           <a:p>
             <a:pPr algn="ctr"/>
-            <a:endParaRPr lang="en-US"/>
-          </a:p>
-        </p:txBody>
-      </p:sp>
-      <p:sp>
-        <p:nvSpPr>
-          <p:cNvPr id="4" name="Title 3">
-            <a:extLst>
-              <a:ext uri="{FF2B5EF4-FFF2-40B4-BE49-F238E27FC236}">
-                <a16:creationId xmlns:a16="http://schemas.microsoft.com/office/drawing/2014/main" id="{A94A5FD9-49FD-4310-B87E-4EA3EEAB13AE}"/>
-              </a:ext>
-            </a:extLst>
-          </p:cNvPr>
-          <p:cNvSpPr>
-            <a:spLocks noGrp="1"/>
-          </p:cNvSpPr>
-          <p:nvPr>
-            <p:ph type="title"/>
-          </p:nvPr>
-        </p:nvSpPr>
-        <p:spPr>
-          <a:xfrm>
-            <a:off x="838200" y="365126"/>
-            <a:ext cx="10515600" cy="455958"/>
-          </a:xfrm>
-        </p:spPr>
-        <p:txBody>
-          <a:bodyPr>
-            <a:normAutofit fontScale="90000"/>
-          </a:bodyPr>
-          <a:lstStyle/>
-          <a:p>
-            <a:r>
-              <a:rPr lang="en-US" dirty="0"/>
-              <a:t>The measured temperature</a:t>
-            </a:r>
-          </a:p>
-        </p:txBody>
-      </p:sp>
-      <p:sp>
-        <p:nvSpPr>
-          <p:cNvPr id="6" name="Oval 5">
-            <a:extLst>
-              <a:ext uri="{FF2B5EF4-FFF2-40B4-BE49-F238E27FC236}">
-                <a16:creationId xmlns:a16="http://schemas.microsoft.com/office/drawing/2014/main" id="{D1C83E78-93F0-4E1D-9B8D-D40C561264B2}"/>
+            <a:r>
+              <a:rPr lang="en-US" sz="1400" u="sng" dirty="0"/>
+              <a:t>Unit of measure</a:t>
+            </a:r>
+          </a:p>
+          <a:p>
+            <a:pPr algn="ctr"/>
+            <a:r>
+              <a:rPr lang="en-US" sz="1400" dirty="0"/>
+              <a:t>Degrees Fahrenheit</a:t>
+            </a:r>
+          </a:p>
+          <a:p>
+            <a:pPr algn="ctr"/>
+            <a:r>
+              <a:rPr lang="en-US" sz="1200" dirty="0"/>
+              <a:t>(Temperature, value)</a:t>
+            </a:r>
+          </a:p>
+        </p:txBody>
+      </p:sp>
+      <p:sp>
+        <p:nvSpPr>
+          <p:cNvPr id="8" name="Oval 7">
+            <a:extLst>
+              <a:ext uri="{FF2B5EF4-FFF2-40B4-BE49-F238E27FC236}">
+                <a16:creationId xmlns:a16="http://schemas.microsoft.com/office/drawing/2014/main" id="{EA579E9C-2187-4830-A087-EE506C93DCA1}"/>
               </a:ext>
             </a:extLst>
           </p:cNvPr>
@@ -6172,8 +6574,8 @@
         </p:nvSpPr>
         <p:spPr>
           <a:xfrm>
-            <a:off x="9630731" y="1534059"/>
-            <a:ext cx="2224718" cy="1298377"/>
+            <a:off x="5115652" y="1303504"/>
+            <a:ext cx="1821143" cy="822305"/>
           </a:xfrm>
           <a:prstGeom prst="ellipse">
             <a:avLst/>
@@ -6203,32 +6605,25 @@
           <a:p>
             <a:pPr algn="ctr"/>
             <a:r>
-              <a:rPr lang="en-US" sz="1400" u="sng" dirty="0"/>
-              <a:t>Unit of measure</a:t>
+              <a:rPr lang="en-US" sz="1600" u="sng" dirty="0"/>
+              <a:t>Patient</a:t>
             </a:r>
           </a:p>
           <a:p>
             <a:pPr algn="ctr"/>
             <a:r>
-              <a:rPr lang="en-US" sz="1400" dirty="0"/>
-              <a:t>Degrees Fahrenheit</a:t>
-            </a:r>
-          </a:p>
-          <a:p>
-            <a:pPr algn="ctr"/>
-            <a:r>
-              <a:rPr lang="en-US" sz="1200" dirty="0"/>
-              <a:t>(Temperature, value)</a:t>
-            </a:r>
-          </a:p>
-        </p:txBody>
-      </p:sp>
-      <p:sp>
-        <p:nvSpPr>
-          <p:cNvPr id="8" name="Oval 7">
-            <a:extLst>
-              <a:ext uri="{FF2B5EF4-FFF2-40B4-BE49-F238E27FC236}">
-                <a16:creationId xmlns:a16="http://schemas.microsoft.com/office/drawing/2014/main" id="{EA579E9C-2187-4830-A087-EE506C93DCA1}"/>
+              <a:rPr lang="en-US" sz="1600" dirty="0"/>
+              <a:t>Joe Smith</a:t>
+            </a:r>
+          </a:p>
+        </p:txBody>
+      </p:sp>
+      <p:sp>
+        <p:nvSpPr>
+          <p:cNvPr id="10" name="Oval 9">
+            <a:extLst>
+              <a:ext uri="{FF2B5EF4-FFF2-40B4-BE49-F238E27FC236}">
+                <a16:creationId xmlns:a16="http://schemas.microsoft.com/office/drawing/2014/main" id="{868E8BA2-3BB1-4F64-A910-04253BB0BA82}"/>
               </a:ext>
             </a:extLst>
           </p:cNvPr>
@@ -6237,8 +6632,8 @@
         </p:nvSpPr>
         <p:spPr>
           <a:xfrm>
-            <a:off x="5115652" y="1303504"/>
-            <a:ext cx="1821143" cy="822305"/>
+            <a:off x="9715946" y="5553778"/>
+            <a:ext cx="2139503" cy="432792"/>
           </a:xfrm>
           <a:prstGeom prst="ellipse">
             <a:avLst/>
@@ -6268,128 +6663,12 @@
           <a:p>
             <a:pPr algn="ctr"/>
             <a:r>
-              <a:rPr lang="en-US" sz="1600" u="sng" dirty="0"/>
-              <a:t>Patient</a:t>
-            </a:r>
-          </a:p>
-          <a:p>
-            <a:pPr algn="ctr"/>
-            <a:r>
-              <a:rPr lang="en-US" sz="1600" dirty="0"/>
-              <a:t>Joe Smith</a:t>
-            </a:r>
-          </a:p>
-        </p:txBody>
-      </p:sp>
-      <p:sp>
-        <p:nvSpPr>
-          <p:cNvPr id="10" name="Oval 9">
-            <a:extLst>
-              <a:ext uri="{FF2B5EF4-FFF2-40B4-BE49-F238E27FC236}">
-                <a16:creationId xmlns:a16="http://schemas.microsoft.com/office/drawing/2014/main" id="{868E8BA2-3BB1-4F64-A910-04253BB0BA82}"/>
-              </a:ext>
-            </a:extLst>
-          </p:cNvPr>
-          <p:cNvSpPr/>
-          <p:nvPr/>
-        </p:nvSpPr>
-        <p:spPr>
-          <a:xfrm>
-            <a:off x="9715946" y="5553778"/>
-            <a:ext cx="2139503" cy="432792"/>
-          </a:xfrm>
-          <a:prstGeom prst="ellipse">
-            <a:avLst/>
-          </a:prstGeom>
-        </p:spPr>
-        <p:style>
-          <a:lnRef idx="2">
-            <a:schemeClr val="accent1">
-              <a:shade val="50000"/>
-            </a:schemeClr>
-          </a:lnRef>
-          <a:fillRef idx="1">
-            <a:schemeClr val="accent1"/>
-          </a:fillRef>
-          <a:effectRef idx="0">
-            <a:schemeClr val="accent1"/>
-          </a:effectRef>
-          <a:fontRef idx="minor">
-            <a:schemeClr val="lt1"/>
-          </a:fontRef>
-        </p:style>
-        <p:txBody>
-          <a:bodyPr wrap="square" rtlCol="0" anchor="ctr">
-            <a:spAutoFit/>
-          </a:bodyPr>
-          <a:lstStyle/>
-          <a:p>
-            <a:pPr algn="ctr"/>
-            <a:r>
               <a:rPr lang="en-US" sz="1400" dirty="0" err="1"/>
               <a:t>Snomed</a:t>
             </a:r>
             <a:r>
               <a:rPr lang="en-US" sz="1400" dirty="0"/>
               <a:t>: mouth</a:t>
-            </a:r>
-          </a:p>
-        </p:txBody>
-      </p:sp>
-      <p:sp>
-        <p:nvSpPr>
-          <p:cNvPr id="12" name="Oval 11">
-            <a:extLst>
-              <a:ext uri="{FF2B5EF4-FFF2-40B4-BE49-F238E27FC236}">
-                <a16:creationId xmlns:a16="http://schemas.microsoft.com/office/drawing/2014/main" id="{BE83EF5E-22AA-4BAE-8A5C-1FC7E9AF1F10}"/>
-              </a:ext>
-            </a:extLst>
-          </p:cNvPr>
-          <p:cNvSpPr/>
-          <p:nvPr/>
-        </p:nvSpPr>
-        <p:spPr>
-          <a:xfrm>
-            <a:off x="2212112" y="3182214"/>
-            <a:ext cx="2165800" cy="973782"/>
-          </a:xfrm>
-          <a:prstGeom prst="ellipse">
-            <a:avLst/>
-          </a:prstGeom>
-        </p:spPr>
-        <p:style>
-          <a:lnRef idx="2">
-            <a:schemeClr val="accent1">
-              <a:shade val="50000"/>
-            </a:schemeClr>
-          </a:lnRef>
-          <a:fillRef idx="1">
-            <a:schemeClr val="accent1"/>
-          </a:fillRef>
-          <a:effectRef idx="0">
-            <a:schemeClr val="accent1"/>
-          </a:effectRef>
-          <a:fontRef idx="minor">
-            <a:schemeClr val="lt1"/>
-          </a:fontRef>
-        </p:style>
-        <p:txBody>
-          <a:bodyPr wrap="square" rtlCol="0" anchor="ctr">
-            <a:spAutoFit/>
-          </a:bodyPr>
-          <a:lstStyle/>
-          <a:p>
-            <a:pPr algn="ctr"/>
-            <a:r>
-              <a:rPr lang="en-US" sz="1400" dirty="0"/>
-              <a:t>Measurement Result</a:t>
-            </a:r>
-          </a:p>
-          <a:p>
-            <a:pPr algn="ctr"/>
-            <a:r>
-              <a:rPr lang="en-US" sz="1100" dirty="0"/>
-              <a:t>(Observation, Belief)</a:t>
             </a:r>
           </a:p>
         </p:txBody>
@@ -6738,41 +7017,6 @@
       </p:cxnSp>
       <p:sp>
         <p:nvSpPr>
-          <p:cNvPr id="53" name="TextBox 52">
-            <a:extLst>
-              <a:ext uri="{FF2B5EF4-FFF2-40B4-BE49-F238E27FC236}">
-                <a16:creationId xmlns:a16="http://schemas.microsoft.com/office/drawing/2014/main" id="{E0EC3DBA-62BF-4813-B9BE-3CB676D2B65A}"/>
-              </a:ext>
-            </a:extLst>
-          </p:cNvPr>
-          <p:cNvSpPr txBox="1"/>
-          <p:nvPr/>
-        </p:nvSpPr>
-        <p:spPr>
-          <a:xfrm rot="16200000">
-            <a:off x="5488258" y="4981417"/>
-            <a:ext cx="768159" cy="307777"/>
-          </a:xfrm>
-          <a:prstGeom prst="rect">
-            <a:avLst/>
-          </a:prstGeom>
-          <a:noFill/>
-        </p:spPr>
-        <p:txBody>
-          <a:bodyPr wrap="none" rtlCol="0">
-            <a:spAutoFit/>
-          </a:bodyPr>
-          <a:lstStyle/>
-          <a:p>
-            <a:r>
-              <a:rPr lang="en-US" sz="1400" dirty="0"/>
-              <a:t>is about</a:t>
-            </a:r>
-          </a:p>
-        </p:txBody>
-      </p:sp>
-      <p:sp>
-        <p:nvSpPr>
           <p:cNvPr id="59" name="Arrow: Pentagon 58">
             <a:extLst>
               <a:ext uri="{FF2B5EF4-FFF2-40B4-BE49-F238E27FC236}">
@@ -7172,10 +7416,10 @@
       </p:sp>
       <p:sp>
         <p:nvSpPr>
-          <p:cNvPr id="93" name="TextBox 92">
-            <a:extLst>
-              <a:ext uri="{FF2B5EF4-FFF2-40B4-BE49-F238E27FC236}">
-                <a16:creationId xmlns:a16="http://schemas.microsoft.com/office/drawing/2014/main" id="{672EE3A9-EEA3-4525-8A33-475F991CDB13}"/>
+          <p:cNvPr id="94" name="TextBox 93">
+            <a:extLst>
+              <a:ext uri="{FF2B5EF4-FFF2-40B4-BE49-F238E27FC236}">
+                <a16:creationId xmlns:a16="http://schemas.microsoft.com/office/drawing/2014/main" id="{63B96D5D-050B-4FB8-905C-26129F789A39}"/>
               </a:ext>
             </a:extLst>
           </p:cNvPr>
@@ -7184,8 +7428,8 @@
         </p:nvSpPr>
         <p:spPr>
           <a:xfrm>
-            <a:off x="2152027" y="4267987"/>
-            <a:ext cx="2338512" cy="261610"/>
+            <a:off x="10785697" y="5211608"/>
+            <a:ext cx="896591" cy="307777"/>
           </a:xfrm>
           <a:prstGeom prst="rect">
             <a:avLst/>
@@ -7199,78 +7443,8 @@
           <a:lstStyle/>
           <a:p>
             <a:r>
-              <a:rPr lang="en-US" sz="1100" dirty="0"/>
-              <a:t>Occurs at: 1/20/2010 4:30pm EST</a:t>
-            </a:r>
-          </a:p>
-        </p:txBody>
-      </p:sp>
-      <p:sp>
-        <p:nvSpPr>
-          <p:cNvPr id="94" name="TextBox 93">
-            <a:extLst>
-              <a:ext uri="{FF2B5EF4-FFF2-40B4-BE49-F238E27FC236}">
-                <a16:creationId xmlns:a16="http://schemas.microsoft.com/office/drawing/2014/main" id="{63B96D5D-050B-4FB8-905C-26129F789A39}"/>
-              </a:ext>
-            </a:extLst>
-          </p:cNvPr>
-          <p:cNvSpPr txBox="1"/>
-          <p:nvPr/>
-        </p:nvSpPr>
-        <p:spPr>
-          <a:xfrm>
-            <a:off x="10785697" y="5211608"/>
-            <a:ext cx="896591" cy="307777"/>
-          </a:xfrm>
-          <a:prstGeom prst="rect">
-            <a:avLst/>
-          </a:prstGeom>
-          <a:noFill/>
-        </p:spPr>
-        <p:txBody>
-          <a:bodyPr wrap="square" rtlCol="0">
-            <a:spAutoFit/>
-          </a:bodyPr>
-          <a:lstStyle/>
-          <a:p>
-            <a:r>
               <a:rPr lang="en-US" sz="1400" dirty="0"/>
               <a:t>Body site</a:t>
-            </a:r>
-          </a:p>
-        </p:txBody>
-      </p:sp>
-      <p:sp>
-        <p:nvSpPr>
-          <p:cNvPr id="95" name="TextBox 94">
-            <a:extLst>
-              <a:ext uri="{FF2B5EF4-FFF2-40B4-BE49-F238E27FC236}">
-                <a16:creationId xmlns:a16="http://schemas.microsoft.com/office/drawing/2014/main" id="{90CC8662-7F82-4C98-8D7B-7A912A572DC0}"/>
-              </a:ext>
-            </a:extLst>
-          </p:cNvPr>
-          <p:cNvSpPr txBox="1"/>
-          <p:nvPr/>
-        </p:nvSpPr>
-        <p:spPr>
-          <a:xfrm rot="16200000">
-            <a:off x="4199782" y="4314179"/>
-            <a:ext cx="1073922" cy="307777"/>
-          </a:xfrm>
-          <a:prstGeom prst="rect">
-            <a:avLst/>
-          </a:prstGeom>
-          <a:noFill/>
-        </p:spPr>
-        <p:txBody>
-          <a:bodyPr wrap="square" rtlCol="0">
-            <a:spAutoFit/>
-          </a:bodyPr>
-          <a:lstStyle/>
-          <a:p>
-            <a:r>
-              <a:rPr lang="en-US" sz="1400" dirty="0"/>
-              <a:t>Is subject of</a:t>
             </a:r>
           </a:p>
         </p:txBody>
@@ -7429,55 +7603,12 @@
           </a:p>
         </p:txBody>
       </p:sp>
-      <p:cxnSp>
-        <p:nvCxnSpPr>
-          <p:cNvPr id="111" name="Connector: Curved 110">
-            <a:extLst>
-              <a:ext uri="{FF2B5EF4-FFF2-40B4-BE49-F238E27FC236}">
-                <a16:creationId xmlns:a16="http://schemas.microsoft.com/office/drawing/2014/main" id="{907A8CEF-7DCD-4E23-A47C-B1B6C810C80A}"/>
-              </a:ext>
-            </a:extLst>
-          </p:cNvPr>
-          <p:cNvCxnSpPr>
-            <a:cxnSpLocks/>
-            <a:stCxn id="104" idx="0"/>
-            <a:endCxn id="49" idx="1"/>
-          </p:cNvCxnSpPr>
-          <p:nvPr/>
-        </p:nvCxnSpPr>
-        <p:spPr>
-          <a:xfrm rot="5400000" flipH="1" flipV="1">
-            <a:off x="1028154" y="4020941"/>
-            <a:ext cx="1133645" cy="880861"/>
-          </a:xfrm>
-          <a:prstGeom prst="curvedConnector2">
-            <a:avLst/>
-          </a:prstGeom>
-          <a:ln>
-            <a:tailEnd type="triangle"/>
-          </a:ln>
-        </p:spPr>
-        <p:style>
-          <a:lnRef idx="1">
-            <a:schemeClr val="accent1"/>
-          </a:lnRef>
-          <a:fillRef idx="0">
-            <a:schemeClr val="accent1"/>
-          </a:fillRef>
-          <a:effectRef idx="0">
-            <a:schemeClr val="accent1"/>
-          </a:effectRef>
-          <a:fontRef idx="minor">
-            <a:schemeClr val="tx1"/>
-          </a:fontRef>
-        </p:style>
-      </p:cxnSp>
-      <p:sp>
-        <p:nvSpPr>
-          <p:cNvPr id="116" name="TextBox 115">
-            <a:extLst>
-              <a:ext uri="{FF2B5EF4-FFF2-40B4-BE49-F238E27FC236}">
-                <a16:creationId xmlns:a16="http://schemas.microsoft.com/office/drawing/2014/main" id="{14FF77E0-988B-4C0D-9001-C7070A863EE9}"/>
+      <p:sp>
+        <p:nvSpPr>
+          <p:cNvPr id="118" name="TextBox 117">
+            <a:extLst>
+              <a:ext uri="{FF2B5EF4-FFF2-40B4-BE49-F238E27FC236}">
+                <a16:creationId xmlns:a16="http://schemas.microsoft.com/office/drawing/2014/main" id="{86EDB684-3211-4F23-8BA3-CE86DF16F5E3}"/>
               </a:ext>
             </a:extLst>
           </p:cNvPr>
@@ -7485,9 +7616,9 @@
           <p:nvPr/>
         </p:nvSpPr>
         <p:spPr>
-          <a:xfrm rot="19694836">
-            <a:off x="1115803" y="3801974"/>
-            <a:ext cx="992921" cy="307777"/>
+          <a:xfrm>
+            <a:off x="2288708" y="4828885"/>
+            <a:ext cx="1267368" cy="307777"/>
           </a:xfrm>
           <a:prstGeom prst="rect">
             <a:avLst/>
@@ -7502,42 +7633,7 @@
           <a:p>
             <a:r>
               <a:rPr lang="en-US" sz="1400" dirty="0"/>
-              <a:t>Results in</a:t>
-            </a:r>
-          </a:p>
-        </p:txBody>
-      </p:sp>
-      <p:sp>
-        <p:nvSpPr>
-          <p:cNvPr id="118" name="TextBox 117">
-            <a:extLst>
-              <a:ext uri="{FF2B5EF4-FFF2-40B4-BE49-F238E27FC236}">
-                <a16:creationId xmlns:a16="http://schemas.microsoft.com/office/drawing/2014/main" id="{86EDB684-3211-4F23-8BA3-CE86DF16F5E3}"/>
-              </a:ext>
-            </a:extLst>
-          </p:cNvPr>
-          <p:cNvSpPr txBox="1"/>
-          <p:nvPr/>
-        </p:nvSpPr>
-        <p:spPr>
-          <a:xfrm>
-            <a:off x="1178752" y="4740594"/>
-            <a:ext cx="1267368" cy="307777"/>
-          </a:xfrm>
-          <a:prstGeom prst="rect">
-            <a:avLst/>
-          </a:prstGeom>
-          <a:noFill/>
-        </p:spPr>
-        <p:txBody>
-          <a:bodyPr wrap="square" rtlCol="0">
-            <a:spAutoFit/>
-          </a:bodyPr>
-          <a:lstStyle/>
-          <a:p>
-            <a:r>
-              <a:rPr lang="en-US" sz="1400" dirty="0"/>
-              <a:t>Results from</a:t>
+              <a:t>Determined by</a:t>
             </a:r>
           </a:p>
         </p:txBody>
@@ -7857,51 +7953,6 @@
       </p:sp>
       <p:cxnSp>
         <p:nvCxnSpPr>
-          <p:cNvPr id="172" name="Connector: Curved 171">
-            <a:extLst>
-              <a:ext uri="{FF2B5EF4-FFF2-40B4-BE49-F238E27FC236}">
-                <a16:creationId xmlns:a16="http://schemas.microsoft.com/office/drawing/2014/main" id="{DD461550-93F7-49BC-B46B-0041B79576D2}"/>
-              </a:ext>
-            </a:extLst>
-          </p:cNvPr>
-          <p:cNvCxnSpPr>
-            <a:cxnSpLocks/>
-            <a:stCxn id="49" idx="3"/>
-            <a:endCxn id="47" idx="1"/>
-          </p:cNvCxnSpPr>
-          <p:nvPr/>
-        </p:nvCxnSpPr>
-        <p:spPr>
-          <a:xfrm>
-            <a:off x="4592588" y="3894548"/>
-            <a:ext cx="1444652" cy="1754930"/>
-          </a:xfrm>
-          <a:prstGeom prst="curvedConnector3">
-            <a:avLst>
-              <a:gd name="adj1" fmla="val 50000"/>
-            </a:avLst>
-          </a:prstGeom>
-          <a:ln>
-            <a:tailEnd type="triangle"/>
-          </a:ln>
-        </p:spPr>
-        <p:style>
-          <a:lnRef idx="1">
-            <a:schemeClr val="accent1"/>
-          </a:lnRef>
-          <a:fillRef idx="0">
-            <a:schemeClr val="accent1"/>
-          </a:fillRef>
-          <a:effectRef idx="0">
-            <a:schemeClr val="accent1"/>
-          </a:effectRef>
-          <a:fontRef idx="minor">
-            <a:schemeClr val="tx1"/>
-          </a:fontRef>
-        </p:style>
-      </p:cxnSp>
-      <p:cxnSp>
-        <p:nvCxnSpPr>
           <p:cNvPr id="186" name="Connector: Curved 185">
             <a:extLst>
               <a:ext uri="{FF2B5EF4-FFF2-40B4-BE49-F238E27FC236}">
@@ -8104,61 +8155,6 @@
               <a:rPr lang="en-US" sz="1400" dirty="0"/>
               <a:t>Has finding</a:t>
             </a:r>
-          </a:p>
-        </p:txBody>
-      </p:sp>
-      <p:sp>
-        <p:nvSpPr>
-          <p:cNvPr id="2" name="&quot;Not Allowed&quot; Symbol 1">
-            <a:extLst>
-              <a:ext uri="{FF2B5EF4-FFF2-40B4-BE49-F238E27FC236}">
-                <a16:creationId xmlns:a16="http://schemas.microsoft.com/office/drawing/2014/main" id="{0D4DD7A1-F58E-4EDD-B73B-F38F3E7FD0F0}"/>
-              </a:ext>
-            </a:extLst>
-          </p:cNvPr>
-          <p:cNvSpPr/>
-          <p:nvPr/>
-        </p:nvSpPr>
-        <p:spPr>
-          <a:xfrm>
-            <a:off x="2152027" y="3044599"/>
-            <a:ext cx="2388573" cy="1666166"/>
-          </a:xfrm>
-          <a:prstGeom prst="noSmoking">
-            <a:avLst/>
-          </a:prstGeom>
-          <a:solidFill>
-            <a:srgbClr val="FF0000">
-              <a:alpha val="34000"/>
-            </a:srgbClr>
-          </a:solidFill>
-        </p:spPr>
-        <p:style>
-          <a:lnRef idx="2">
-            <a:schemeClr val="accent1">
-              <a:shade val="50000"/>
-            </a:schemeClr>
-          </a:lnRef>
-          <a:fillRef idx="1">
-            <a:schemeClr val="accent1"/>
-          </a:fillRef>
-          <a:effectRef idx="0">
-            <a:schemeClr val="accent1"/>
-          </a:effectRef>
-          <a:fontRef idx="minor">
-            <a:schemeClr val="lt1"/>
-          </a:fontRef>
-        </p:style>
-        <p:txBody>
-          <a:bodyPr rtlCol="0" anchor="ctr"/>
-          <a:lstStyle/>
-          <a:p>
-            <a:pPr algn="ctr"/>
-            <a:endParaRPr lang="en-US">
-              <a:solidFill>
-                <a:schemeClr val="tx1"/>
-              </a:solidFill>
-            </a:endParaRPr>
           </a:p>
         </p:txBody>
       </p:sp>
@@ -8192,12 +8188,153 @@
           <a:chExt cx="0" cy="0"/>
         </a:xfrm>
       </p:grpSpPr>
+      <p:sp>
+        <p:nvSpPr>
+          <p:cNvPr id="9" name="Speech Bubble: Rectangle with Corners Rounded 8">
+            <a:extLst>
+              <a:ext uri="{FF2B5EF4-FFF2-40B4-BE49-F238E27FC236}">
+                <a16:creationId xmlns:a16="http://schemas.microsoft.com/office/drawing/2014/main" id="{94C5111E-5306-4D16-9F46-232676075103}"/>
+              </a:ext>
+            </a:extLst>
+          </p:cNvPr>
+          <p:cNvSpPr/>
+          <p:nvPr/>
+        </p:nvSpPr>
+        <p:spPr>
+          <a:xfrm>
+            <a:off x="7713822" y="4046074"/>
+            <a:ext cx="760219" cy="398834"/>
+          </a:xfrm>
+          <a:prstGeom prst="wedgeRoundRectCallout">
+            <a:avLst>
+              <a:gd name="adj1" fmla="val 60024"/>
+              <a:gd name="adj2" fmla="val 85417"/>
+              <a:gd name="adj3" fmla="val 16667"/>
+            </a:avLst>
+          </a:prstGeom>
+        </p:spPr>
+        <p:style>
+          <a:lnRef idx="2">
+            <a:schemeClr val="accent1">
+              <a:shade val="50000"/>
+            </a:schemeClr>
+          </a:lnRef>
+          <a:fillRef idx="1">
+            <a:schemeClr val="accent1"/>
+          </a:fillRef>
+          <a:effectRef idx="0">
+            <a:schemeClr val="accent1"/>
+          </a:effectRef>
+          <a:fontRef idx="minor">
+            <a:schemeClr val="lt1"/>
+          </a:fontRef>
+        </p:style>
+        <p:txBody>
+          <a:bodyPr rtlCol="0" anchor="ctr"/>
+          <a:lstStyle/>
+          <a:p>
+            <a:pPr algn="ctr"/>
+            <a:r>
+              <a:rPr lang="en-US" sz="1200" dirty="0"/>
+              <a:t>Needs work</a:t>
+            </a:r>
+          </a:p>
+        </p:txBody>
+      </p:sp>
+      <p:sp>
+        <p:nvSpPr>
+          <p:cNvPr id="10" name="Speech Bubble: Rectangle with Corners Rounded 9">
+            <a:extLst>
+              <a:ext uri="{FF2B5EF4-FFF2-40B4-BE49-F238E27FC236}">
+                <a16:creationId xmlns:a16="http://schemas.microsoft.com/office/drawing/2014/main" id="{D655F85D-C1D6-4773-8E88-EA7196A51899}"/>
+              </a:ext>
+            </a:extLst>
+          </p:cNvPr>
+          <p:cNvSpPr/>
+          <p:nvPr/>
+        </p:nvSpPr>
+        <p:spPr>
+          <a:xfrm>
+            <a:off x="5210783" y="3030166"/>
+            <a:ext cx="760219" cy="398834"/>
+          </a:xfrm>
+          <a:prstGeom prst="wedgeRoundRectCallout">
+            <a:avLst>
+              <a:gd name="adj1" fmla="val 47228"/>
+              <a:gd name="adj2" fmla="val 141515"/>
+              <a:gd name="adj3" fmla="val 16667"/>
+            </a:avLst>
+          </a:prstGeom>
+        </p:spPr>
+        <p:style>
+          <a:lnRef idx="2">
+            <a:schemeClr val="accent1">
+              <a:shade val="50000"/>
+            </a:schemeClr>
+          </a:lnRef>
+          <a:fillRef idx="1">
+            <a:schemeClr val="accent1"/>
+          </a:fillRef>
+          <a:effectRef idx="0">
+            <a:schemeClr val="accent1"/>
+          </a:effectRef>
+          <a:fontRef idx="minor">
+            <a:schemeClr val="lt1"/>
+          </a:fontRef>
+        </p:style>
+        <p:txBody>
+          <a:bodyPr rtlCol="0" anchor="ctr"/>
+          <a:lstStyle/>
+          <a:p>
+            <a:pPr algn="ctr"/>
+            <a:r>
+              <a:rPr lang="en-US" sz="1200" dirty="0"/>
+              <a:t>Thinking about</a:t>
+            </a:r>
+          </a:p>
+        </p:txBody>
+      </p:sp>
+      <p:sp>
+        <p:nvSpPr>
+          <p:cNvPr id="17" name="TextBox 16">
+            <a:extLst>
+              <a:ext uri="{FF2B5EF4-FFF2-40B4-BE49-F238E27FC236}">
+                <a16:creationId xmlns:a16="http://schemas.microsoft.com/office/drawing/2014/main" id="{1E5ED116-08D4-420F-9290-3C8499906B87}"/>
+              </a:ext>
+            </a:extLst>
+          </p:cNvPr>
+          <p:cNvSpPr txBox="1"/>
+          <p:nvPr/>
+        </p:nvSpPr>
+        <p:spPr>
+          <a:xfrm rot="16200000">
+            <a:off x="-960527" y="3198168"/>
+            <a:ext cx="3005246" cy="461665"/>
+          </a:xfrm>
+          <a:prstGeom prst="rect">
+            <a:avLst/>
+          </a:prstGeom>
+          <a:noFill/>
+        </p:spPr>
+        <p:txBody>
+          <a:bodyPr wrap="none" rtlCol="0">
+            <a:spAutoFit/>
+          </a:bodyPr>
+          <a:lstStyle/>
+          <a:p>
+            <a:r>
+              <a:rPr lang="en-US" sz="2400" dirty="0"/>
+              <a:t>UML Instance Diagram</a:t>
+            </a:r>
+          </a:p>
+        </p:txBody>
+      </p:sp>
       <p:pic>
         <p:nvPicPr>
-          <p:cNvPr id="16" name="Picture 15">
-            <a:extLst>
-              <a:ext uri="{FF2B5EF4-FFF2-40B4-BE49-F238E27FC236}">
-                <a16:creationId xmlns:a16="http://schemas.microsoft.com/office/drawing/2014/main" id="{C44B5019-F379-46FE-9436-0615D1C201A4}"/>
+          <p:cNvPr id="3" name="Picture 2">
+            <a:extLst>
+              <a:ext uri="{FF2B5EF4-FFF2-40B4-BE49-F238E27FC236}">
+                <a16:creationId xmlns:a16="http://schemas.microsoft.com/office/drawing/2014/main" id="{6F284EC5-BD04-46F9-8F4F-65A6654D8AAF}"/>
               </a:ext>
             </a:extLst>
           </p:cNvPr>
@@ -8222,147 +8359,6 @@
           </a:prstGeom>
         </p:spPr>
       </p:pic>
-      <p:sp>
-        <p:nvSpPr>
-          <p:cNvPr id="9" name="Speech Bubble: Rectangle with Corners Rounded 8">
-            <a:extLst>
-              <a:ext uri="{FF2B5EF4-FFF2-40B4-BE49-F238E27FC236}">
-                <a16:creationId xmlns:a16="http://schemas.microsoft.com/office/drawing/2014/main" id="{94C5111E-5306-4D16-9F46-232676075103}"/>
-              </a:ext>
-            </a:extLst>
-          </p:cNvPr>
-          <p:cNvSpPr/>
-          <p:nvPr/>
-        </p:nvSpPr>
-        <p:spPr>
-          <a:xfrm>
-            <a:off x="7713822" y="4046074"/>
-            <a:ext cx="760219" cy="398834"/>
-          </a:xfrm>
-          <a:prstGeom prst="wedgeRoundRectCallout">
-            <a:avLst>
-              <a:gd name="adj1" fmla="val 60024"/>
-              <a:gd name="adj2" fmla="val 85417"/>
-              <a:gd name="adj3" fmla="val 16667"/>
-            </a:avLst>
-          </a:prstGeom>
-        </p:spPr>
-        <p:style>
-          <a:lnRef idx="2">
-            <a:schemeClr val="accent1">
-              <a:shade val="50000"/>
-            </a:schemeClr>
-          </a:lnRef>
-          <a:fillRef idx="1">
-            <a:schemeClr val="accent1"/>
-          </a:fillRef>
-          <a:effectRef idx="0">
-            <a:schemeClr val="accent1"/>
-          </a:effectRef>
-          <a:fontRef idx="minor">
-            <a:schemeClr val="lt1"/>
-          </a:fontRef>
-        </p:style>
-        <p:txBody>
-          <a:bodyPr rtlCol="0" anchor="ctr"/>
-          <a:lstStyle/>
-          <a:p>
-            <a:pPr algn="ctr"/>
-            <a:r>
-              <a:rPr lang="en-US" sz="1200" dirty="0"/>
-              <a:t>Needs work</a:t>
-            </a:r>
-          </a:p>
-        </p:txBody>
-      </p:sp>
-      <p:sp>
-        <p:nvSpPr>
-          <p:cNvPr id="10" name="Speech Bubble: Rectangle with Corners Rounded 9">
-            <a:extLst>
-              <a:ext uri="{FF2B5EF4-FFF2-40B4-BE49-F238E27FC236}">
-                <a16:creationId xmlns:a16="http://schemas.microsoft.com/office/drawing/2014/main" id="{D655F85D-C1D6-4773-8E88-EA7196A51899}"/>
-              </a:ext>
-            </a:extLst>
-          </p:cNvPr>
-          <p:cNvSpPr/>
-          <p:nvPr/>
-        </p:nvSpPr>
-        <p:spPr>
-          <a:xfrm>
-            <a:off x="5210783" y="3030166"/>
-            <a:ext cx="760219" cy="398834"/>
-          </a:xfrm>
-          <a:prstGeom prst="wedgeRoundRectCallout">
-            <a:avLst>
-              <a:gd name="adj1" fmla="val 47228"/>
-              <a:gd name="adj2" fmla="val 141515"/>
-              <a:gd name="adj3" fmla="val 16667"/>
-            </a:avLst>
-          </a:prstGeom>
-        </p:spPr>
-        <p:style>
-          <a:lnRef idx="2">
-            <a:schemeClr val="accent1">
-              <a:shade val="50000"/>
-            </a:schemeClr>
-          </a:lnRef>
-          <a:fillRef idx="1">
-            <a:schemeClr val="accent1"/>
-          </a:fillRef>
-          <a:effectRef idx="0">
-            <a:schemeClr val="accent1"/>
-          </a:effectRef>
-          <a:fontRef idx="minor">
-            <a:schemeClr val="lt1"/>
-          </a:fontRef>
-        </p:style>
-        <p:txBody>
-          <a:bodyPr rtlCol="0" anchor="ctr"/>
-          <a:lstStyle/>
-          <a:p>
-            <a:pPr algn="ctr"/>
-            <a:r>
-              <a:rPr lang="en-US" sz="1200" dirty="0"/>
-              <a:t>Thinking about</a:t>
-            </a:r>
-          </a:p>
-        </p:txBody>
-      </p:sp>
-      <p:sp>
-        <p:nvSpPr>
-          <p:cNvPr id="17" name="TextBox 16">
-            <a:extLst>
-              <a:ext uri="{FF2B5EF4-FFF2-40B4-BE49-F238E27FC236}">
-                <a16:creationId xmlns:a16="http://schemas.microsoft.com/office/drawing/2014/main" id="{1E5ED116-08D4-420F-9290-3C8499906B87}"/>
-              </a:ext>
-            </a:extLst>
-          </p:cNvPr>
-          <p:cNvSpPr txBox="1"/>
-          <p:nvPr/>
-        </p:nvSpPr>
-        <p:spPr>
-          <a:xfrm rot="16200000">
-            <a:off x="-960527" y="3198168"/>
-            <a:ext cx="3005246" cy="461665"/>
-          </a:xfrm>
-          <a:prstGeom prst="rect">
-            <a:avLst/>
-          </a:prstGeom>
-          <a:noFill/>
-        </p:spPr>
-        <p:txBody>
-          <a:bodyPr wrap="none" rtlCol="0">
-            <a:spAutoFit/>
-          </a:bodyPr>
-          <a:lstStyle/>
-          <a:p>
-            <a:r>
-              <a:rPr lang="en-US" sz="2400" dirty="0"/>
-              <a:t>UML Instance Diagram</a:t>
-            </a:r>
-          </a:p>
-        </p:txBody>
-      </p:sp>
     </p:spTree>
     <p:extLst>
       <p:ext uri="{BB962C8B-B14F-4D97-AF65-F5344CB8AC3E}">
@@ -8393,12 +8389,47 @@
           <a:chExt cx="0" cy="0"/>
         </a:xfrm>
       </p:grpSpPr>
+      <p:sp>
+        <p:nvSpPr>
+          <p:cNvPr id="4" name="TextBox 3">
+            <a:extLst>
+              <a:ext uri="{FF2B5EF4-FFF2-40B4-BE49-F238E27FC236}">
+                <a16:creationId xmlns:a16="http://schemas.microsoft.com/office/drawing/2014/main" id="{16F8AC6D-5D13-4811-9DE4-A64C7C7FE29D}"/>
+              </a:ext>
+            </a:extLst>
+          </p:cNvPr>
+          <p:cNvSpPr txBox="1"/>
+          <p:nvPr/>
+        </p:nvSpPr>
+        <p:spPr>
+          <a:xfrm rot="16200000">
+            <a:off x="-917019" y="3198168"/>
+            <a:ext cx="2918235" cy="461665"/>
+          </a:xfrm>
+          <a:prstGeom prst="rect">
+            <a:avLst/>
+          </a:prstGeom>
+          <a:noFill/>
+        </p:spPr>
+        <p:txBody>
+          <a:bodyPr wrap="none" rtlCol="0">
+            <a:spAutoFit/>
+          </a:bodyPr>
+          <a:lstStyle/>
+          <a:p>
+            <a:r>
+              <a:rPr lang="en-US" sz="2400" dirty="0"/>
+              <a:t>UML Model Fragment</a:t>
+            </a:r>
+          </a:p>
+        </p:txBody>
+      </p:sp>
       <p:pic>
         <p:nvPicPr>
-          <p:cNvPr id="3" name="Picture 2">
-            <a:extLst>
-              <a:ext uri="{FF2B5EF4-FFF2-40B4-BE49-F238E27FC236}">
-                <a16:creationId xmlns:a16="http://schemas.microsoft.com/office/drawing/2014/main" id="{C98D5E90-3920-4254-8E13-34ADD35DE7D0}"/>
+          <p:cNvPr id="5" name="Picture 4">
+            <a:extLst>
+              <a:ext uri="{FF2B5EF4-FFF2-40B4-BE49-F238E27FC236}">
+                <a16:creationId xmlns:a16="http://schemas.microsoft.com/office/drawing/2014/main" id="{E7B91E0F-42CC-41D2-B841-FF9715822803}"/>
               </a:ext>
             </a:extLst>
           </p:cNvPr>
@@ -8415,49 +8446,14 @@
         </p:blipFill>
         <p:spPr>
           <a:xfrm>
-            <a:off x="814031" y="0"/>
-            <a:ext cx="10563938" cy="6858000"/>
+            <a:off x="851556" y="140111"/>
+            <a:ext cx="10488888" cy="6577778"/>
           </a:xfrm>
           <a:prstGeom prst="rect">
             <a:avLst/>
           </a:prstGeom>
         </p:spPr>
       </p:pic>
-      <p:sp>
-        <p:nvSpPr>
-          <p:cNvPr id="4" name="TextBox 3">
-            <a:extLst>
-              <a:ext uri="{FF2B5EF4-FFF2-40B4-BE49-F238E27FC236}">
-                <a16:creationId xmlns:a16="http://schemas.microsoft.com/office/drawing/2014/main" id="{16F8AC6D-5D13-4811-9DE4-A64C7C7FE29D}"/>
-              </a:ext>
-            </a:extLst>
-          </p:cNvPr>
-          <p:cNvSpPr txBox="1"/>
-          <p:nvPr/>
-        </p:nvSpPr>
-        <p:spPr>
-          <a:xfrm rot="16200000">
-            <a:off x="-917019" y="3198168"/>
-            <a:ext cx="2918235" cy="461665"/>
-          </a:xfrm>
-          <a:prstGeom prst="rect">
-            <a:avLst/>
-          </a:prstGeom>
-          <a:noFill/>
-        </p:spPr>
-        <p:txBody>
-          <a:bodyPr wrap="none" rtlCol="0">
-            <a:spAutoFit/>
-          </a:bodyPr>
-          <a:lstStyle/>
-          <a:p>
-            <a:r>
-              <a:rPr lang="en-US" sz="2400" dirty="0"/>
-              <a:t>UML Model Fragment</a:t>
-            </a:r>
-          </a:p>
-        </p:txBody>
-      </p:sp>
     </p:spTree>
     <p:extLst>
       <p:ext uri="{BB962C8B-B14F-4D97-AF65-F5344CB8AC3E}">
@@ -8488,36 +8484,6 @@
           <a:chExt cx="0" cy="0"/>
         </a:xfrm>
       </p:grpSpPr>
-      <p:pic>
-        <p:nvPicPr>
-          <p:cNvPr id="3" name="Picture 2">
-            <a:extLst>
-              <a:ext uri="{FF2B5EF4-FFF2-40B4-BE49-F238E27FC236}">
-                <a16:creationId xmlns:a16="http://schemas.microsoft.com/office/drawing/2014/main" id="{CC74E1D8-A6D6-4155-AFD5-39DF2FDD51DD}"/>
-              </a:ext>
-            </a:extLst>
-          </p:cNvPr>
-          <p:cNvPicPr>
-            <a:picLocks noChangeAspect="1"/>
-          </p:cNvPicPr>
-          <p:nvPr/>
-        </p:nvPicPr>
-        <p:blipFill>
-          <a:blip r:embed="rId2"/>
-          <a:stretch>
-            <a:fillRect/>
-          </a:stretch>
-        </p:blipFill>
-        <p:spPr>
-          <a:xfrm>
-            <a:off x="0" y="2128131"/>
-            <a:ext cx="12192000" cy="2601738"/>
-          </a:xfrm>
-          <a:prstGeom prst="rect">
-            <a:avLst/>
-          </a:prstGeom>
-        </p:spPr>
-      </p:pic>
       <p:sp>
         <p:nvSpPr>
           <p:cNvPr id="4" name="Title 3">
@@ -8546,10 +8512,2356 @@
           </a:p>
         </p:txBody>
       </p:sp>
+      <p:pic>
+        <p:nvPicPr>
+          <p:cNvPr id="5" name="Picture 1">
+            <a:extLst>
+              <a:ext uri="{FF2B5EF4-FFF2-40B4-BE49-F238E27FC236}">
+                <a16:creationId xmlns:a16="http://schemas.microsoft.com/office/drawing/2014/main" id="{BE4F4DE9-8728-4389-A1BF-CECA239E4884}"/>
+              </a:ext>
+            </a:extLst>
+          </p:cNvPr>
+          <p:cNvPicPr>
+            <a:picLocks noChangeAspect="1" noChangeArrowheads="1"/>
+          </p:cNvPicPr>
+          <p:nvPr/>
+        </p:nvPicPr>
+        <p:blipFill>
+          <a:blip r:embed="rId2">
+            <a:extLst>
+              <a:ext uri="{28A0092B-C50C-407E-A947-70E740481C1C}">
+                <a14:useLocalDpi xmlns:a14="http://schemas.microsoft.com/office/drawing/2010/main" val="0"/>
+              </a:ext>
+            </a:extLst>
+          </a:blip>
+          <a:srcRect/>
+          <a:stretch>
+            <a:fillRect/>
+          </a:stretch>
+        </p:blipFill>
+        <p:spPr bwMode="auto">
+          <a:xfrm>
+            <a:off x="1213338" y="1469730"/>
+            <a:ext cx="10696994" cy="4764016"/>
+          </a:xfrm>
+          <a:prstGeom prst="rect">
+            <a:avLst/>
+          </a:prstGeom>
+          <a:noFill/>
+          <a:ln>
+            <a:noFill/>
+          </a:ln>
+          <a:extLst>
+            <a:ext uri="{909E8E84-426E-40DD-AFC4-6F175D3DCCD1}">
+              <a14:hiddenFill xmlns:a14="http://schemas.microsoft.com/office/drawing/2010/main">
+                <a:solidFill>
+                  <a:srgbClr val="FFFFFF"/>
+                </a:solidFill>
+              </a14:hiddenFill>
+            </a:ext>
+            <a:ext uri="{91240B29-F687-4F45-9708-019B960494DF}">
+              <a14:hiddenLine xmlns:a14="http://schemas.microsoft.com/office/drawing/2010/main" w="9525">
+                <a:solidFill>
+                  <a:srgbClr val="000000"/>
+                </a:solidFill>
+                <a:miter lim="800000"/>
+                <a:headEnd/>
+                <a:tailEnd/>
+              </a14:hiddenLine>
+            </a:ext>
+          </a:extLst>
+        </p:spPr>
+      </p:pic>
     </p:spTree>
     <p:extLst>
       <p:ext uri="{BB962C8B-B14F-4D97-AF65-F5344CB8AC3E}">
         <p14:creationId xmlns:p14="http://schemas.microsoft.com/office/powerpoint/2010/main" val="1608507142"/>
+      </p:ext>
+    </p:extLst>
+  </p:cSld>
+  <p:clrMapOvr>
+    <a:masterClrMapping/>
+  </p:clrMapOvr>
+</p:sld>
+</file>
+
+<file path=ppt/slides/slide8.xml><?xml version="1.0" encoding="utf-8"?>
+<p:sld xmlns:a="http://schemas.openxmlformats.org/drawingml/2006/main" xmlns:r="http://schemas.openxmlformats.org/officeDocument/2006/relationships" xmlns:p="http://schemas.openxmlformats.org/presentationml/2006/main">
+  <p:cSld>
+    <p:spTree>
+      <p:nvGrpSpPr>
+        <p:cNvPr id="1" name=""/>
+        <p:cNvGrpSpPr/>
+        <p:nvPr/>
+      </p:nvGrpSpPr>
+      <p:grpSpPr>
+        <a:xfrm>
+          <a:off x="0" y="0"/>
+          <a:ext cx="0" cy="0"/>
+          <a:chOff x="0" y="0"/>
+          <a:chExt cx="0" cy="0"/>
+        </a:xfrm>
+      </p:grpSpPr>
+      <p:sp>
+        <p:nvSpPr>
+          <p:cNvPr id="2" name="Title 1">
+            <a:extLst>
+              <a:ext uri="{FF2B5EF4-FFF2-40B4-BE49-F238E27FC236}">
+                <a16:creationId xmlns:a16="http://schemas.microsoft.com/office/drawing/2014/main" id="{6CB07ADD-843A-4323-8524-0027A72EFAB3}"/>
+              </a:ext>
+            </a:extLst>
+          </p:cNvPr>
+          <p:cNvSpPr>
+            <a:spLocks noGrp="1"/>
+          </p:cNvSpPr>
+          <p:nvPr>
+            <p:ph type="title"/>
+          </p:nvPr>
+        </p:nvSpPr>
+        <p:spPr/>
+        <p:txBody>
+          <a:bodyPr/>
+          <a:lstStyle/>
+          <a:p>
+            <a:r>
+              <a:rPr lang="en-US" dirty="0"/>
+              <a:t>OLD VERSION</a:t>
+            </a:r>
+          </a:p>
+        </p:txBody>
+      </p:sp>
+    </p:spTree>
+    <p:extLst>
+      <p:ext uri="{BB962C8B-B14F-4D97-AF65-F5344CB8AC3E}">
+        <p14:creationId xmlns:p14="http://schemas.microsoft.com/office/powerpoint/2010/main" val="973052472"/>
+      </p:ext>
+    </p:extLst>
+  </p:cSld>
+  <p:clrMapOvr>
+    <a:masterClrMapping/>
+  </p:clrMapOvr>
+</p:sld>
+</file>
+
+<file path=ppt/slides/slide9.xml><?xml version="1.0" encoding="utf-8"?>
+<p:sld xmlns:a="http://schemas.openxmlformats.org/drawingml/2006/main" xmlns:r="http://schemas.openxmlformats.org/officeDocument/2006/relationships" xmlns:p="http://schemas.openxmlformats.org/presentationml/2006/main">
+  <p:cSld>
+    <p:spTree>
+      <p:nvGrpSpPr>
+        <p:cNvPr id="1" name=""/>
+        <p:cNvGrpSpPr/>
+        <p:nvPr/>
+      </p:nvGrpSpPr>
+      <p:grpSpPr>
+        <a:xfrm>
+          <a:off x="0" y="0"/>
+          <a:ext cx="0" cy="0"/>
+          <a:chOff x="0" y="0"/>
+          <a:chExt cx="0" cy="0"/>
+        </a:xfrm>
+      </p:grpSpPr>
+      <p:sp>
+        <p:nvSpPr>
+          <p:cNvPr id="49" name="Rectangle 48">
+            <a:extLst>
+              <a:ext uri="{FF2B5EF4-FFF2-40B4-BE49-F238E27FC236}">
+                <a16:creationId xmlns:a16="http://schemas.microsoft.com/office/drawing/2014/main" id="{0E29895D-CA84-4CC1-8FB2-33A1F4038028}"/>
+              </a:ext>
+            </a:extLst>
+          </p:cNvPr>
+          <p:cNvSpPr/>
+          <p:nvPr/>
+        </p:nvSpPr>
+        <p:spPr>
+          <a:xfrm>
+            <a:off x="2035407" y="3044599"/>
+            <a:ext cx="2557181" cy="1699898"/>
+          </a:xfrm>
+          <a:prstGeom prst="rect">
+            <a:avLst/>
+          </a:prstGeom>
+          <a:solidFill>
+            <a:schemeClr val="accent1">
+              <a:lumMod val="20000"/>
+              <a:lumOff val="80000"/>
+            </a:schemeClr>
+          </a:solidFill>
+        </p:spPr>
+        <p:style>
+          <a:lnRef idx="2">
+            <a:schemeClr val="accent1">
+              <a:shade val="50000"/>
+            </a:schemeClr>
+          </a:lnRef>
+          <a:fillRef idx="1">
+            <a:schemeClr val="accent1"/>
+          </a:fillRef>
+          <a:effectRef idx="0">
+            <a:schemeClr val="accent1"/>
+          </a:effectRef>
+          <a:fontRef idx="minor">
+            <a:schemeClr val="lt1"/>
+          </a:fontRef>
+        </p:style>
+        <p:txBody>
+          <a:bodyPr rtlCol="0" anchor="ctr"/>
+          <a:lstStyle/>
+          <a:p>
+            <a:pPr algn="ctr"/>
+            <a:endParaRPr lang="en-US"/>
+          </a:p>
+        </p:txBody>
+      </p:sp>
+      <p:sp>
+        <p:nvSpPr>
+          <p:cNvPr id="47" name="Rectangle 46">
+            <a:extLst>
+              <a:ext uri="{FF2B5EF4-FFF2-40B4-BE49-F238E27FC236}">
+                <a16:creationId xmlns:a16="http://schemas.microsoft.com/office/drawing/2014/main" id="{CFE3C31D-C0DC-43B3-9090-71A27EB1110D}"/>
+              </a:ext>
+            </a:extLst>
+          </p:cNvPr>
+          <p:cNvSpPr/>
+          <p:nvPr/>
+        </p:nvSpPr>
+        <p:spPr>
+          <a:xfrm>
+            <a:off x="6037240" y="4620783"/>
+            <a:ext cx="2484582" cy="2057390"/>
+          </a:xfrm>
+          <a:prstGeom prst="rect">
+            <a:avLst/>
+          </a:prstGeom>
+          <a:solidFill>
+            <a:schemeClr val="accent1">
+              <a:lumMod val="20000"/>
+              <a:lumOff val="80000"/>
+            </a:schemeClr>
+          </a:solidFill>
+        </p:spPr>
+        <p:style>
+          <a:lnRef idx="2">
+            <a:schemeClr val="accent1">
+              <a:shade val="50000"/>
+            </a:schemeClr>
+          </a:lnRef>
+          <a:fillRef idx="1">
+            <a:schemeClr val="accent1"/>
+          </a:fillRef>
+          <a:effectRef idx="0">
+            <a:schemeClr val="accent1"/>
+          </a:effectRef>
+          <a:fontRef idx="minor">
+            <a:schemeClr val="lt1"/>
+          </a:fontRef>
+        </p:style>
+        <p:txBody>
+          <a:bodyPr rtlCol="0" anchor="ctr"/>
+          <a:lstStyle/>
+          <a:p>
+            <a:pPr algn="ctr"/>
+            <a:r>
+              <a:rPr lang="en-US" dirty="0"/>
+              <a:t>da</a:t>
+            </a:r>
+          </a:p>
+        </p:txBody>
+      </p:sp>
+      <p:sp>
+        <p:nvSpPr>
+          <p:cNvPr id="35" name="Rectangle 34">
+            <a:extLst>
+              <a:ext uri="{FF2B5EF4-FFF2-40B4-BE49-F238E27FC236}">
+                <a16:creationId xmlns:a16="http://schemas.microsoft.com/office/drawing/2014/main" id="{1945C638-82BC-40D9-8D64-12824887E631}"/>
+              </a:ext>
+            </a:extLst>
+          </p:cNvPr>
+          <p:cNvSpPr/>
+          <p:nvPr/>
+        </p:nvSpPr>
+        <p:spPr>
+          <a:xfrm>
+            <a:off x="9500799" y="1307586"/>
+            <a:ext cx="2484582" cy="1901409"/>
+          </a:xfrm>
+          <a:prstGeom prst="rect">
+            <a:avLst/>
+          </a:prstGeom>
+          <a:solidFill>
+            <a:schemeClr val="accent1">
+              <a:lumMod val="20000"/>
+              <a:lumOff val="80000"/>
+            </a:schemeClr>
+          </a:solidFill>
+        </p:spPr>
+        <p:style>
+          <a:lnRef idx="2">
+            <a:schemeClr val="accent1">
+              <a:shade val="50000"/>
+            </a:schemeClr>
+          </a:lnRef>
+          <a:fillRef idx="1">
+            <a:schemeClr val="accent1"/>
+          </a:fillRef>
+          <a:effectRef idx="0">
+            <a:schemeClr val="accent1"/>
+          </a:effectRef>
+          <a:fontRef idx="minor">
+            <a:schemeClr val="lt1"/>
+          </a:fontRef>
+        </p:style>
+        <p:txBody>
+          <a:bodyPr rtlCol="0" anchor="ctr"/>
+          <a:lstStyle/>
+          <a:p>
+            <a:pPr algn="ctr"/>
+            <a:endParaRPr lang="en-US"/>
+          </a:p>
+        </p:txBody>
+      </p:sp>
+      <p:sp>
+        <p:nvSpPr>
+          <p:cNvPr id="4" name="Title 3">
+            <a:extLst>
+              <a:ext uri="{FF2B5EF4-FFF2-40B4-BE49-F238E27FC236}">
+                <a16:creationId xmlns:a16="http://schemas.microsoft.com/office/drawing/2014/main" id="{A94A5FD9-49FD-4310-B87E-4EA3EEAB13AE}"/>
+              </a:ext>
+            </a:extLst>
+          </p:cNvPr>
+          <p:cNvSpPr>
+            <a:spLocks noGrp="1"/>
+          </p:cNvSpPr>
+          <p:nvPr>
+            <p:ph type="title"/>
+          </p:nvPr>
+        </p:nvSpPr>
+        <p:spPr>
+          <a:xfrm>
+            <a:off x="838200" y="365126"/>
+            <a:ext cx="10515600" cy="455958"/>
+          </a:xfrm>
+        </p:spPr>
+        <p:txBody>
+          <a:bodyPr>
+            <a:normAutofit fontScale="90000"/>
+          </a:bodyPr>
+          <a:lstStyle/>
+          <a:p>
+            <a:r>
+              <a:rPr lang="en-US" dirty="0"/>
+              <a:t>The measured temperature</a:t>
+            </a:r>
+          </a:p>
+        </p:txBody>
+      </p:sp>
+      <p:sp>
+        <p:nvSpPr>
+          <p:cNvPr id="6" name="Oval 5">
+            <a:extLst>
+              <a:ext uri="{FF2B5EF4-FFF2-40B4-BE49-F238E27FC236}">
+                <a16:creationId xmlns:a16="http://schemas.microsoft.com/office/drawing/2014/main" id="{D1C83E78-93F0-4E1D-9B8D-D40C561264B2}"/>
+              </a:ext>
+            </a:extLst>
+          </p:cNvPr>
+          <p:cNvSpPr/>
+          <p:nvPr/>
+        </p:nvSpPr>
+        <p:spPr>
+          <a:xfrm>
+            <a:off x="9630731" y="1534059"/>
+            <a:ext cx="2224718" cy="1298377"/>
+          </a:xfrm>
+          <a:prstGeom prst="ellipse">
+            <a:avLst/>
+          </a:prstGeom>
+        </p:spPr>
+        <p:style>
+          <a:lnRef idx="2">
+            <a:schemeClr val="accent1">
+              <a:shade val="50000"/>
+            </a:schemeClr>
+          </a:lnRef>
+          <a:fillRef idx="1">
+            <a:schemeClr val="accent1"/>
+          </a:fillRef>
+          <a:effectRef idx="0">
+            <a:schemeClr val="accent1"/>
+          </a:effectRef>
+          <a:fontRef idx="minor">
+            <a:schemeClr val="lt1"/>
+          </a:fontRef>
+        </p:style>
+        <p:txBody>
+          <a:bodyPr wrap="square" rtlCol="0" anchor="ctr">
+            <a:spAutoFit/>
+          </a:bodyPr>
+          <a:lstStyle/>
+          <a:p>
+            <a:pPr algn="ctr"/>
+            <a:r>
+              <a:rPr lang="en-US" sz="1400" u="sng" dirty="0"/>
+              <a:t>Unit of measure</a:t>
+            </a:r>
+          </a:p>
+          <a:p>
+            <a:pPr algn="ctr"/>
+            <a:r>
+              <a:rPr lang="en-US" sz="1400" dirty="0"/>
+              <a:t>Degrees Fahrenheit</a:t>
+            </a:r>
+          </a:p>
+          <a:p>
+            <a:pPr algn="ctr"/>
+            <a:r>
+              <a:rPr lang="en-US" sz="1200" dirty="0"/>
+              <a:t>(Temperature, value)</a:t>
+            </a:r>
+          </a:p>
+        </p:txBody>
+      </p:sp>
+      <p:sp>
+        <p:nvSpPr>
+          <p:cNvPr id="8" name="Oval 7">
+            <a:extLst>
+              <a:ext uri="{FF2B5EF4-FFF2-40B4-BE49-F238E27FC236}">
+                <a16:creationId xmlns:a16="http://schemas.microsoft.com/office/drawing/2014/main" id="{EA579E9C-2187-4830-A087-EE506C93DCA1}"/>
+              </a:ext>
+            </a:extLst>
+          </p:cNvPr>
+          <p:cNvSpPr/>
+          <p:nvPr/>
+        </p:nvSpPr>
+        <p:spPr>
+          <a:xfrm>
+            <a:off x="5115652" y="1303504"/>
+            <a:ext cx="1821143" cy="822305"/>
+          </a:xfrm>
+          <a:prstGeom prst="ellipse">
+            <a:avLst/>
+          </a:prstGeom>
+        </p:spPr>
+        <p:style>
+          <a:lnRef idx="2">
+            <a:schemeClr val="accent1">
+              <a:shade val="50000"/>
+            </a:schemeClr>
+          </a:lnRef>
+          <a:fillRef idx="1">
+            <a:schemeClr val="accent1"/>
+          </a:fillRef>
+          <a:effectRef idx="0">
+            <a:schemeClr val="accent1"/>
+          </a:effectRef>
+          <a:fontRef idx="minor">
+            <a:schemeClr val="lt1"/>
+          </a:fontRef>
+        </p:style>
+        <p:txBody>
+          <a:bodyPr wrap="square" rtlCol="0" anchor="ctr">
+            <a:spAutoFit/>
+          </a:bodyPr>
+          <a:lstStyle/>
+          <a:p>
+            <a:pPr algn="ctr"/>
+            <a:r>
+              <a:rPr lang="en-US" sz="1600" u="sng" dirty="0"/>
+              <a:t>Patient</a:t>
+            </a:r>
+          </a:p>
+          <a:p>
+            <a:pPr algn="ctr"/>
+            <a:r>
+              <a:rPr lang="en-US" sz="1600" dirty="0"/>
+              <a:t>Joe Smith</a:t>
+            </a:r>
+          </a:p>
+        </p:txBody>
+      </p:sp>
+      <p:sp>
+        <p:nvSpPr>
+          <p:cNvPr id="10" name="Oval 9">
+            <a:extLst>
+              <a:ext uri="{FF2B5EF4-FFF2-40B4-BE49-F238E27FC236}">
+                <a16:creationId xmlns:a16="http://schemas.microsoft.com/office/drawing/2014/main" id="{868E8BA2-3BB1-4F64-A910-04253BB0BA82}"/>
+              </a:ext>
+            </a:extLst>
+          </p:cNvPr>
+          <p:cNvSpPr/>
+          <p:nvPr/>
+        </p:nvSpPr>
+        <p:spPr>
+          <a:xfrm>
+            <a:off x="9715946" y="5553778"/>
+            <a:ext cx="2139503" cy="432792"/>
+          </a:xfrm>
+          <a:prstGeom prst="ellipse">
+            <a:avLst/>
+          </a:prstGeom>
+        </p:spPr>
+        <p:style>
+          <a:lnRef idx="2">
+            <a:schemeClr val="accent1">
+              <a:shade val="50000"/>
+            </a:schemeClr>
+          </a:lnRef>
+          <a:fillRef idx="1">
+            <a:schemeClr val="accent1"/>
+          </a:fillRef>
+          <a:effectRef idx="0">
+            <a:schemeClr val="accent1"/>
+          </a:effectRef>
+          <a:fontRef idx="minor">
+            <a:schemeClr val="lt1"/>
+          </a:fontRef>
+        </p:style>
+        <p:txBody>
+          <a:bodyPr wrap="square" rtlCol="0" anchor="ctr">
+            <a:spAutoFit/>
+          </a:bodyPr>
+          <a:lstStyle/>
+          <a:p>
+            <a:pPr algn="ctr"/>
+            <a:r>
+              <a:rPr lang="en-US" sz="1400" dirty="0" err="1"/>
+              <a:t>Snomed</a:t>
+            </a:r>
+            <a:r>
+              <a:rPr lang="en-US" sz="1400" dirty="0"/>
+              <a:t>: mouth</a:t>
+            </a:r>
+          </a:p>
+        </p:txBody>
+      </p:sp>
+      <p:sp>
+        <p:nvSpPr>
+          <p:cNvPr id="12" name="Oval 11">
+            <a:extLst>
+              <a:ext uri="{FF2B5EF4-FFF2-40B4-BE49-F238E27FC236}">
+                <a16:creationId xmlns:a16="http://schemas.microsoft.com/office/drawing/2014/main" id="{BE83EF5E-22AA-4BAE-8A5C-1FC7E9AF1F10}"/>
+              </a:ext>
+            </a:extLst>
+          </p:cNvPr>
+          <p:cNvSpPr/>
+          <p:nvPr/>
+        </p:nvSpPr>
+        <p:spPr>
+          <a:xfrm>
+            <a:off x="2212112" y="3182214"/>
+            <a:ext cx="2165800" cy="973782"/>
+          </a:xfrm>
+          <a:prstGeom prst="ellipse">
+            <a:avLst/>
+          </a:prstGeom>
+        </p:spPr>
+        <p:style>
+          <a:lnRef idx="2">
+            <a:schemeClr val="accent1">
+              <a:shade val="50000"/>
+            </a:schemeClr>
+          </a:lnRef>
+          <a:fillRef idx="1">
+            <a:schemeClr val="accent1"/>
+          </a:fillRef>
+          <a:effectRef idx="0">
+            <a:schemeClr val="accent1"/>
+          </a:effectRef>
+          <a:fontRef idx="minor">
+            <a:schemeClr val="lt1"/>
+          </a:fontRef>
+        </p:style>
+        <p:txBody>
+          <a:bodyPr wrap="square" rtlCol="0" anchor="ctr">
+            <a:spAutoFit/>
+          </a:bodyPr>
+          <a:lstStyle/>
+          <a:p>
+            <a:pPr algn="ctr"/>
+            <a:r>
+              <a:rPr lang="en-US" sz="1400" dirty="0"/>
+              <a:t>Measurement Result</a:t>
+            </a:r>
+          </a:p>
+          <a:p>
+            <a:pPr algn="ctr"/>
+            <a:r>
+              <a:rPr lang="en-US" sz="1100" dirty="0"/>
+              <a:t>(Observation, Belief)</a:t>
+            </a:r>
+          </a:p>
+        </p:txBody>
+      </p:sp>
+      <p:sp>
+        <p:nvSpPr>
+          <p:cNvPr id="13" name="Oval 12">
+            <a:extLst>
+              <a:ext uri="{FF2B5EF4-FFF2-40B4-BE49-F238E27FC236}">
+                <a16:creationId xmlns:a16="http://schemas.microsoft.com/office/drawing/2014/main" id="{C5F73E5F-6C8D-4D77-A5B1-BA638D4A22DF}"/>
+              </a:ext>
+            </a:extLst>
+          </p:cNvPr>
+          <p:cNvSpPr/>
+          <p:nvPr/>
+        </p:nvSpPr>
+        <p:spPr>
+          <a:xfrm>
+            <a:off x="3349619" y="5899566"/>
+            <a:ext cx="1762845" cy="858778"/>
+          </a:xfrm>
+          <a:prstGeom prst="ellipse">
+            <a:avLst/>
+          </a:prstGeom>
+        </p:spPr>
+        <p:style>
+          <a:lnRef idx="2">
+            <a:schemeClr val="accent1">
+              <a:shade val="50000"/>
+            </a:schemeClr>
+          </a:lnRef>
+          <a:fillRef idx="1">
+            <a:schemeClr val="accent1"/>
+          </a:fillRef>
+          <a:effectRef idx="0">
+            <a:schemeClr val="accent1"/>
+          </a:effectRef>
+          <a:fontRef idx="minor">
+            <a:schemeClr val="lt1"/>
+          </a:fontRef>
+        </p:style>
+        <p:txBody>
+          <a:bodyPr wrap="square" rtlCol="0" anchor="ctr">
+            <a:spAutoFit/>
+          </a:bodyPr>
+          <a:lstStyle/>
+          <a:p>
+            <a:pPr algn="ctr"/>
+            <a:r>
+              <a:rPr lang="en-US" sz="1600" u="sng" dirty="0"/>
+              <a:t>Individual</a:t>
+            </a:r>
+          </a:p>
+          <a:p>
+            <a:pPr algn="ctr"/>
+            <a:r>
+              <a:rPr lang="en-US" sz="1600" dirty="0"/>
+              <a:t>Nurse Jackie</a:t>
+            </a:r>
+          </a:p>
+        </p:txBody>
+      </p:sp>
+      <p:sp>
+        <p:nvSpPr>
+          <p:cNvPr id="14" name="Oval 13">
+            <a:extLst>
+              <a:ext uri="{FF2B5EF4-FFF2-40B4-BE49-F238E27FC236}">
+                <a16:creationId xmlns:a16="http://schemas.microsoft.com/office/drawing/2014/main" id="{9A5D5A82-EF3D-4D14-80F9-B5B56AC30BCB}"/>
+              </a:ext>
+            </a:extLst>
+          </p:cNvPr>
+          <p:cNvSpPr/>
+          <p:nvPr/>
+        </p:nvSpPr>
+        <p:spPr>
+          <a:xfrm>
+            <a:off x="6218063" y="4715462"/>
+            <a:ext cx="2133600" cy="779026"/>
+          </a:xfrm>
+          <a:prstGeom prst="ellipse">
+            <a:avLst/>
+          </a:prstGeom>
+        </p:spPr>
+        <p:style>
+          <a:lnRef idx="2">
+            <a:schemeClr val="accent1">
+              <a:shade val="50000"/>
+            </a:schemeClr>
+          </a:lnRef>
+          <a:fillRef idx="1">
+            <a:schemeClr val="accent1"/>
+          </a:fillRef>
+          <a:effectRef idx="0">
+            <a:schemeClr val="accent1"/>
+          </a:effectRef>
+          <a:fontRef idx="minor">
+            <a:schemeClr val="lt1"/>
+          </a:fontRef>
+        </p:style>
+        <p:txBody>
+          <a:bodyPr rtlCol="0" anchor="ctr">
+            <a:spAutoFit/>
+          </a:bodyPr>
+          <a:lstStyle/>
+          <a:p>
+            <a:pPr algn="ctr"/>
+            <a:r>
+              <a:rPr lang="en-US" sz="1600" dirty="0"/>
+              <a:t>Vital Sign</a:t>
+            </a:r>
+          </a:p>
+          <a:p>
+            <a:pPr algn="ctr"/>
+            <a:r>
+              <a:rPr lang="en-US" sz="1400" dirty="0"/>
+              <a:t>(quality, situation)</a:t>
+            </a:r>
+          </a:p>
+        </p:txBody>
+      </p:sp>
+      <p:sp>
+        <p:nvSpPr>
+          <p:cNvPr id="15" name="Oval 14">
+            <a:extLst>
+              <a:ext uri="{FF2B5EF4-FFF2-40B4-BE49-F238E27FC236}">
+                <a16:creationId xmlns:a16="http://schemas.microsoft.com/office/drawing/2014/main" id="{8CA4BF5A-5A92-49D1-B4C1-EA9841EC25BA}"/>
+              </a:ext>
+            </a:extLst>
+          </p:cNvPr>
+          <p:cNvSpPr/>
+          <p:nvPr/>
+        </p:nvSpPr>
+        <p:spPr>
+          <a:xfrm>
+            <a:off x="6286778" y="5491927"/>
+            <a:ext cx="2057471" cy="649188"/>
+          </a:xfrm>
+          <a:prstGeom prst="ellipse">
+            <a:avLst/>
+          </a:prstGeom>
+        </p:spPr>
+        <p:style>
+          <a:lnRef idx="2">
+            <a:schemeClr val="accent1">
+              <a:shade val="50000"/>
+            </a:schemeClr>
+          </a:lnRef>
+          <a:fillRef idx="1">
+            <a:schemeClr val="accent1"/>
+          </a:fillRef>
+          <a:effectRef idx="0">
+            <a:schemeClr val="accent1"/>
+          </a:effectRef>
+          <a:fontRef idx="minor">
+            <a:schemeClr val="lt1"/>
+          </a:fontRef>
+        </p:style>
+        <p:txBody>
+          <a:bodyPr wrap="square" rtlCol="0" anchor="ctr">
+            <a:spAutoFit/>
+          </a:bodyPr>
+          <a:lstStyle/>
+          <a:p>
+            <a:pPr algn="ctr"/>
+            <a:r>
+              <a:rPr lang="en-US" sz="1200" dirty="0" err="1"/>
+              <a:t>Snomed</a:t>
+            </a:r>
+            <a:r>
+              <a:rPr lang="en-US" sz="1200" dirty="0"/>
+              <a:t>: body temperature</a:t>
+            </a:r>
+          </a:p>
+        </p:txBody>
+      </p:sp>
+      <p:cxnSp>
+        <p:nvCxnSpPr>
+          <p:cNvPr id="3" name="Connector: Curved 2">
+            <a:extLst>
+              <a:ext uri="{FF2B5EF4-FFF2-40B4-BE49-F238E27FC236}">
+                <a16:creationId xmlns:a16="http://schemas.microsoft.com/office/drawing/2014/main" id="{12D3D1E2-94C6-4FC8-876B-3F4F13574380}"/>
+              </a:ext>
+            </a:extLst>
+          </p:cNvPr>
+          <p:cNvCxnSpPr>
+            <a:cxnSpLocks/>
+            <a:stCxn id="47" idx="0"/>
+            <a:endCxn id="8" idx="4"/>
+          </p:cNvCxnSpPr>
+          <p:nvPr/>
+        </p:nvCxnSpPr>
+        <p:spPr>
+          <a:xfrm rot="16200000" flipV="1">
+            <a:off x="5405391" y="2746642"/>
+            <a:ext cx="2494974" cy="1253307"/>
+          </a:xfrm>
+          <a:prstGeom prst="curvedConnector3">
+            <a:avLst>
+              <a:gd name="adj1" fmla="val 50000"/>
+            </a:avLst>
+          </a:prstGeom>
+          <a:ln>
+            <a:tailEnd type="triangle"/>
+          </a:ln>
+        </p:spPr>
+        <p:style>
+          <a:lnRef idx="1">
+            <a:schemeClr val="accent1"/>
+          </a:lnRef>
+          <a:fillRef idx="0">
+            <a:schemeClr val="accent1"/>
+          </a:fillRef>
+          <a:effectRef idx="0">
+            <a:schemeClr val="accent1"/>
+          </a:effectRef>
+          <a:fontRef idx="minor">
+            <a:schemeClr val="tx1"/>
+          </a:fontRef>
+        </p:style>
+      </p:cxnSp>
+      <p:cxnSp>
+        <p:nvCxnSpPr>
+          <p:cNvPr id="31" name="Connector: Curved 30">
+            <a:extLst>
+              <a:ext uri="{FF2B5EF4-FFF2-40B4-BE49-F238E27FC236}">
+                <a16:creationId xmlns:a16="http://schemas.microsoft.com/office/drawing/2014/main" id="{D3E48B73-A1F9-43A5-8718-1998665A1B40}"/>
+              </a:ext>
+            </a:extLst>
+          </p:cNvPr>
+          <p:cNvCxnSpPr>
+            <a:cxnSpLocks/>
+            <a:stCxn id="47" idx="3"/>
+            <a:endCxn id="35" idx="1"/>
+          </p:cNvCxnSpPr>
+          <p:nvPr/>
+        </p:nvCxnSpPr>
+        <p:spPr>
+          <a:xfrm flipV="1">
+            <a:off x="8521822" y="2258291"/>
+            <a:ext cx="978977" cy="3391187"/>
+          </a:xfrm>
+          <a:prstGeom prst="curvedConnector3">
+            <a:avLst>
+              <a:gd name="adj1" fmla="val 50000"/>
+            </a:avLst>
+          </a:prstGeom>
+          <a:ln>
+            <a:tailEnd type="triangle"/>
+          </a:ln>
+        </p:spPr>
+        <p:style>
+          <a:lnRef idx="1">
+            <a:schemeClr val="accent1"/>
+          </a:lnRef>
+          <a:fillRef idx="0">
+            <a:schemeClr val="accent1"/>
+          </a:fillRef>
+          <a:effectRef idx="0">
+            <a:schemeClr val="accent1"/>
+          </a:effectRef>
+          <a:fontRef idx="minor">
+            <a:schemeClr val="tx1"/>
+          </a:fontRef>
+        </p:style>
+      </p:cxnSp>
+      <p:sp>
+        <p:nvSpPr>
+          <p:cNvPr id="34" name="TextBox 33">
+            <a:extLst>
+              <a:ext uri="{FF2B5EF4-FFF2-40B4-BE49-F238E27FC236}">
+                <a16:creationId xmlns:a16="http://schemas.microsoft.com/office/drawing/2014/main" id="{28FE9A89-97A5-4DAE-9D4E-6E5AC7678576}"/>
+              </a:ext>
+            </a:extLst>
+          </p:cNvPr>
+          <p:cNvSpPr txBox="1"/>
+          <p:nvPr/>
+        </p:nvSpPr>
+        <p:spPr>
+          <a:xfrm rot="16915689">
+            <a:off x="8540907" y="3041091"/>
+            <a:ext cx="1427570" cy="307777"/>
+          </a:xfrm>
+          <a:prstGeom prst="rect">
+            <a:avLst/>
+          </a:prstGeom>
+          <a:noFill/>
+        </p:spPr>
+        <p:txBody>
+          <a:bodyPr wrap="none" rtlCol="0">
+            <a:spAutoFit/>
+          </a:bodyPr>
+          <a:lstStyle/>
+          <a:p>
+            <a:r>
+              <a:rPr lang="en-US" sz="1400" dirty="0"/>
+              <a:t>Has quality value</a:t>
+            </a:r>
+          </a:p>
+        </p:txBody>
+      </p:sp>
+      <p:cxnSp>
+        <p:nvCxnSpPr>
+          <p:cNvPr id="44" name="Connector: Curved 43">
+            <a:extLst>
+              <a:ext uri="{FF2B5EF4-FFF2-40B4-BE49-F238E27FC236}">
+                <a16:creationId xmlns:a16="http://schemas.microsoft.com/office/drawing/2014/main" id="{C7ACBC7D-CFB0-4EC7-9990-F83CF0CEBB5D}"/>
+              </a:ext>
+            </a:extLst>
+          </p:cNvPr>
+          <p:cNvCxnSpPr>
+            <a:cxnSpLocks/>
+            <a:stCxn id="47" idx="3"/>
+            <a:endCxn id="10" idx="0"/>
+          </p:cNvCxnSpPr>
+          <p:nvPr/>
+        </p:nvCxnSpPr>
+        <p:spPr>
+          <a:xfrm flipV="1">
+            <a:off x="8521822" y="5553778"/>
+            <a:ext cx="2263876" cy="95700"/>
+          </a:xfrm>
+          <a:prstGeom prst="curvedConnector4">
+            <a:avLst>
+              <a:gd name="adj1" fmla="val 26373"/>
+              <a:gd name="adj2" fmla="val 1313788"/>
+            </a:avLst>
+          </a:prstGeom>
+          <a:ln>
+            <a:tailEnd type="triangle"/>
+          </a:ln>
+        </p:spPr>
+        <p:style>
+          <a:lnRef idx="1">
+            <a:schemeClr val="accent1"/>
+          </a:lnRef>
+          <a:fillRef idx="0">
+            <a:schemeClr val="accent1"/>
+          </a:fillRef>
+          <a:effectRef idx="0">
+            <a:schemeClr val="accent1"/>
+          </a:effectRef>
+          <a:fontRef idx="minor">
+            <a:schemeClr val="tx1"/>
+          </a:fontRef>
+        </p:style>
+      </p:cxnSp>
+      <p:sp>
+        <p:nvSpPr>
+          <p:cNvPr id="53" name="TextBox 52">
+            <a:extLst>
+              <a:ext uri="{FF2B5EF4-FFF2-40B4-BE49-F238E27FC236}">
+                <a16:creationId xmlns:a16="http://schemas.microsoft.com/office/drawing/2014/main" id="{E0EC3DBA-62BF-4813-B9BE-3CB676D2B65A}"/>
+              </a:ext>
+            </a:extLst>
+          </p:cNvPr>
+          <p:cNvSpPr txBox="1"/>
+          <p:nvPr/>
+        </p:nvSpPr>
+        <p:spPr>
+          <a:xfrm rot="16200000">
+            <a:off x="5488258" y="4981417"/>
+            <a:ext cx="768159" cy="307777"/>
+          </a:xfrm>
+          <a:prstGeom prst="rect">
+            <a:avLst/>
+          </a:prstGeom>
+          <a:noFill/>
+        </p:spPr>
+        <p:txBody>
+          <a:bodyPr wrap="none" rtlCol="0">
+            <a:spAutoFit/>
+          </a:bodyPr>
+          <a:lstStyle/>
+          <a:p>
+            <a:r>
+              <a:rPr lang="en-US" sz="1400" dirty="0"/>
+              <a:t>is about</a:t>
+            </a:r>
+          </a:p>
+        </p:txBody>
+      </p:sp>
+      <p:sp>
+        <p:nvSpPr>
+          <p:cNvPr id="59" name="Arrow: Pentagon 58">
+            <a:extLst>
+              <a:ext uri="{FF2B5EF4-FFF2-40B4-BE49-F238E27FC236}">
+                <a16:creationId xmlns:a16="http://schemas.microsoft.com/office/drawing/2014/main" id="{F458E77A-C7CD-4894-B73B-6F88A24BB91D}"/>
+              </a:ext>
+            </a:extLst>
+          </p:cNvPr>
+          <p:cNvSpPr/>
+          <p:nvPr/>
+        </p:nvSpPr>
+        <p:spPr>
+          <a:xfrm>
+            <a:off x="7111828" y="2629930"/>
+            <a:ext cx="1318775" cy="185245"/>
+          </a:xfrm>
+          <a:prstGeom prst="homePlate">
+            <a:avLst/>
+          </a:prstGeom>
+        </p:spPr>
+        <p:style>
+          <a:lnRef idx="2">
+            <a:schemeClr val="accent1">
+              <a:shade val="50000"/>
+            </a:schemeClr>
+          </a:lnRef>
+          <a:fillRef idx="1">
+            <a:schemeClr val="accent1"/>
+          </a:fillRef>
+          <a:effectRef idx="0">
+            <a:schemeClr val="accent1"/>
+          </a:effectRef>
+          <a:fontRef idx="minor">
+            <a:schemeClr val="lt1"/>
+          </a:fontRef>
+        </p:style>
+        <p:txBody>
+          <a:bodyPr rtlCol="0" anchor="ctr"/>
+          <a:lstStyle/>
+          <a:p>
+            <a:pPr algn="ctr"/>
+            <a:endParaRPr lang="en-US" sz="1200" dirty="0"/>
+          </a:p>
+        </p:txBody>
+      </p:sp>
+      <p:cxnSp>
+        <p:nvCxnSpPr>
+          <p:cNvPr id="63" name="Connector: Curved 62">
+            <a:extLst>
+              <a:ext uri="{FF2B5EF4-FFF2-40B4-BE49-F238E27FC236}">
+                <a16:creationId xmlns:a16="http://schemas.microsoft.com/office/drawing/2014/main" id="{8EA5A202-A05C-4554-8E20-A4B377A8FE7E}"/>
+              </a:ext>
+            </a:extLst>
+          </p:cNvPr>
+          <p:cNvCxnSpPr>
+            <a:cxnSpLocks/>
+            <a:stCxn id="8" idx="5"/>
+            <a:endCxn id="59" idx="1"/>
+          </p:cNvCxnSpPr>
+          <p:nvPr/>
+        </p:nvCxnSpPr>
+        <p:spPr>
+          <a:xfrm rot="16200000" flipH="1">
+            <a:off x="6532377" y="2143102"/>
+            <a:ext cx="717168" cy="441733"/>
+          </a:xfrm>
+          <a:prstGeom prst="curvedConnector2">
+            <a:avLst/>
+          </a:prstGeom>
+          <a:ln>
+            <a:tailEnd type="triangle"/>
+          </a:ln>
+        </p:spPr>
+        <p:style>
+          <a:lnRef idx="1">
+            <a:schemeClr val="accent1"/>
+          </a:lnRef>
+          <a:fillRef idx="0">
+            <a:schemeClr val="accent1"/>
+          </a:fillRef>
+          <a:effectRef idx="0">
+            <a:schemeClr val="accent1"/>
+          </a:effectRef>
+          <a:fontRef idx="minor">
+            <a:schemeClr val="tx1"/>
+          </a:fontRef>
+        </p:style>
+      </p:cxnSp>
+      <p:cxnSp>
+        <p:nvCxnSpPr>
+          <p:cNvPr id="67" name="Connector: Curved 66">
+            <a:extLst>
+              <a:ext uri="{FF2B5EF4-FFF2-40B4-BE49-F238E27FC236}">
+                <a16:creationId xmlns:a16="http://schemas.microsoft.com/office/drawing/2014/main" id="{65D42DD0-DF75-4AB4-86BB-6D680B39A81A}"/>
+              </a:ext>
+            </a:extLst>
+          </p:cNvPr>
+          <p:cNvCxnSpPr>
+            <a:cxnSpLocks/>
+            <a:stCxn id="47" idx="0"/>
+            <a:endCxn id="197" idx="4"/>
+          </p:cNvCxnSpPr>
+          <p:nvPr/>
+        </p:nvCxnSpPr>
+        <p:spPr>
+          <a:xfrm rot="5400000" flipH="1" flipV="1">
+            <a:off x="6773832" y="3649928"/>
+            <a:ext cx="1476555" cy="465156"/>
+          </a:xfrm>
+          <a:prstGeom prst="curvedConnector3">
+            <a:avLst>
+              <a:gd name="adj1" fmla="val 50000"/>
+            </a:avLst>
+          </a:prstGeom>
+          <a:ln>
+            <a:tailEnd type="triangle"/>
+          </a:ln>
+        </p:spPr>
+        <p:style>
+          <a:lnRef idx="1">
+            <a:schemeClr val="accent1"/>
+          </a:lnRef>
+          <a:fillRef idx="0">
+            <a:schemeClr val="accent1"/>
+          </a:fillRef>
+          <a:effectRef idx="0">
+            <a:schemeClr val="accent1"/>
+          </a:effectRef>
+          <a:fontRef idx="minor">
+            <a:schemeClr val="tx1"/>
+          </a:fontRef>
+        </p:style>
+      </p:cxnSp>
+      <p:sp>
+        <p:nvSpPr>
+          <p:cNvPr id="92" name="TextBox 91">
+            <a:extLst>
+              <a:ext uri="{FF2B5EF4-FFF2-40B4-BE49-F238E27FC236}">
+                <a16:creationId xmlns:a16="http://schemas.microsoft.com/office/drawing/2014/main" id="{9A5A48C8-2530-43EE-8153-238E4CC580EF}"/>
+              </a:ext>
+            </a:extLst>
+          </p:cNvPr>
+          <p:cNvSpPr txBox="1"/>
+          <p:nvPr/>
+        </p:nvSpPr>
+        <p:spPr>
+          <a:xfrm rot="1047955">
+            <a:off x="2495118" y="5661186"/>
+            <a:ext cx="1176669" cy="307777"/>
+          </a:xfrm>
+          <a:prstGeom prst="rect">
+            <a:avLst/>
+          </a:prstGeom>
+          <a:noFill/>
+        </p:spPr>
+        <p:txBody>
+          <a:bodyPr wrap="none" rtlCol="0">
+            <a:spAutoFit/>
+          </a:bodyPr>
+          <a:lstStyle/>
+          <a:p>
+            <a:r>
+              <a:rPr lang="en-US" sz="1400" dirty="0"/>
+              <a:t>Performed by</a:t>
+            </a:r>
+          </a:p>
+        </p:txBody>
+      </p:sp>
+      <p:sp>
+        <p:nvSpPr>
+          <p:cNvPr id="81" name="TextBox 80">
+            <a:extLst>
+              <a:ext uri="{FF2B5EF4-FFF2-40B4-BE49-F238E27FC236}">
+                <a16:creationId xmlns:a16="http://schemas.microsoft.com/office/drawing/2014/main" id="{7790A457-F6BD-401B-8778-6998EAF146C2}"/>
+              </a:ext>
+            </a:extLst>
+          </p:cNvPr>
+          <p:cNvSpPr txBox="1"/>
+          <p:nvPr/>
+        </p:nvSpPr>
+        <p:spPr>
+          <a:xfrm>
+            <a:off x="5198735" y="2051058"/>
+            <a:ext cx="896591" cy="307777"/>
+          </a:xfrm>
+          <a:prstGeom prst="rect">
+            <a:avLst/>
+          </a:prstGeom>
+          <a:noFill/>
+        </p:spPr>
+        <p:txBody>
+          <a:bodyPr wrap="square" rtlCol="0">
+            <a:spAutoFit/>
+          </a:bodyPr>
+          <a:lstStyle/>
+          <a:p>
+            <a:r>
+              <a:rPr lang="en-US" sz="1400" dirty="0"/>
+              <a:t>State of</a:t>
+            </a:r>
+          </a:p>
+        </p:txBody>
+      </p:sp>
+      <p:cxnSp>
+        <p:nvCxnSpPr>
+          <p:cNvPr id="51" name="Connector: Curved 50">
+            <a:extLst>
+              <a:ext uri="{FF2B5EF4-FFF2-40B4-BE49-F238E27FC236}">
+                <a16:creationId xmlns:a16="http://schemas.microsoft.com/office/drawing/2014/main" id="{6E1A18AF-BB06-47C9-87A8-8FE25AAB8A26}"/>
+              </a:ext>
+            </a:extLst>
+          </p:cNvPr>
+          <p:cNvCxnSpPr>
+            <a:cxnSpLocks/>
+            <a:stCxn id="59" idx="3"/>
+          </p:cNvCxnSpPr>
+          <p:nvPr/>
+        </p:nvCxnSpPr>
+        <p:spPr>
+          <a:xfrm flipH="1">
+            <a:off x="7896687" y="2722553"/>
+            <a:ext cx="533916" cy="1853129"/>
+          </a:xfrm>
+          <a:prstGeom prst="curvedConnector4">
+            <a:avLst>
+              <a:gd name="adj1" fmla="val -42816"/>
+              <a:gd name="adj2" fmla="val 52499"/>
+            </a:avLst>
+          </a:prstGeom>
+          <a:ln>
+            <a:tailEnd type="triangle"/>
+          </a:ln>
+        </p:spPr>
+        <p:style>
+          <a:lnRef idx="1">
+            <a:schemeClr val="accent1"/>
+          </a:lnRef>
+          <a:fillRef idx="0">
+            <a:schemeClr val="accent1"/>
+          </a:fillRef>
+          <a:effectRef idx="0">
+            <a:schemeClr val="accent1"/>
+          </a:effectRef>
+          <a:fontRef idx="minor">
+            <a:schemeClr val="tx1"/>
+          </a:fontRef>
+        </p:style>
+      </p:cxnSp>
+      <p:sp>
+        <p:nvSpPr>
+          <p:cNvPr id="61" name="TextBox 60">
+            <a:extLst>
+              <a:ext uri="{FF2B5EF4-FFF2-40B4-BE49-F238E27FC236}">
+                <a16:creationId xmlns:a16="http://schemas.microsoft.com/office/drawing/2014/main" id="{6187E28E-31BB-48A6-B815-8D65AFB185C9}"/>
+              </a:ext>
+            </a:extLst>
+          </p:cNvPr>
+          <p:cNvSpPr txBox="1"/>
+          <p:nvPr/>
+        </p:nvSpPr>
+        <p:spPr>
+          <a:xfrm rot="17757798">
+            <a:off x="7000850" y="3495228"/>
+            <a:ext cx="872931" cy="307777"/>
+          </a:xfrm>
+          <a:prstGeom prst="rect">
+            <a:avLst/>
+          </a:prstGeom>
+          <a:noFill/>
+        </p:spPr>
+        <p:txBody>
+          <a:bodyPr wrap="none" rtlCol="0">
+            <a:spAutoFit/>
+          </a:bodyPr>
+          <a:lstStyle/>
+          <a:p>
+            <a:r>
+              <a:rPr lang="en-US" sz="1400" dirty="0"/>
+              <a:t>predicate</a:t>
+            </a:r>
+          </a:p>
+        </p:txBody>
+      </p:sp>
+      <p:cxnSp>
+        <p:nvCxnSpPr>
+          <p:cNvPr id="64" name="Connector: Curved 63">
+            <a:extLst>
+              <a:ext uri="{FF2B5EF4-FFF2-40B4-BE49-F238E27FC236}">
+                <a16:creationId xmlns:a16="http://schemas.microsoft.com/office/drawing/2014/main" id="{95953881-2A33-4C36-A1FB-9585B240377E}"/>
+              </a:ext>
+            </a:extLst>
+          </p:cNvPr>
+          <p:cNvCxnSpPr>
+            <a:cxnSpLocks/>
+            <a:stCxn id="104" idx="3"/>
+            <a:endCxn id="13" idx="2"/>
+          </p:cNvCxnSpPr>
+          <p:nvPr/>
+        </p:nvCxnSpPr>
+        <p:spPr>
+          <a:xfrm>
+            <a:off x="2309091" y="5881437"/>
+            <a:ext cx="1040528" cy="447518"/>
+          </a:xfrm>
+          <a:prstGeom prst="curvedConnector3">
+            <a:avLst>
+              <a:gd name="adj1" fmla="val 50000"/>
+            </a:avLst>
+          </a:prstGeom>
+          <a:ln>
+            <a:tailEnd type="triangle"/>
+          </a:ln>
+        </p:spPr>
+        <p:style>
+          <a:lnRef idx="1">
+            <a:schemeClr val="accent1"/>
+          </a:lnRef>
+          <a:fillRef idx="0">
+            <a:schemeClr val="accent1"/>
+          </a:fillRef>
+          <a:effectRef idx="0">
+            <a:schemeClr val="accent1"/>
+          </a:effectRef>
+          <a:fontRef idx="minor">
+            <a:schemeClr val="tx1"/>
+          </a:fontRef>
+        </p:style>
+      </p:cxnSp>
+      <p:sp>
+        <p:nvSpPr>
+          <p:cNvPr id="60" name="TextBox 59">
+            <a:extLst>
+              <a:ext uri="{FF2B5EF4-FFF2-40B4-BE49-F238E27FC236}">
+                <a16:creationId xmlns:a16="http://schemas.microsoft.com/office/drawing/2014/main" id="{BAE7B074-ECDE-4CB6-BE67-24EF03E729A9}"/>
+              </a:ext>
+            </a:extLst>
+          </p:cNvPr>
+          <p:cNvSpPr txBox="1"/>
+          <p:nvPr/>
+        </p:nvSpPr>
+        <p:spPr>
+          <a:xfrm>
+            <a:off x="10084632" y="2827757"/>
+            <a:ext cx="1675601" cy="307777"/>
+          </a:xfrm>
+          <a:prstGeom prst="rect">
+            <a:avLst/>
+          </a:prstGeom>
+          <a:noFill/>
+        </p:spPr>
+        <p:txBody>
+          <a:bodyPr wrap="square" rtlCol="0">
+            <a:spAutoFit/>
+          </a:bodyPr>
+          <a:lstStyle/>
+          <a:p>
+            <a:r>
+              <a:rPr lang="en-US" sz="1400" dirty="0"/>
+              <a:t>Scaler value:104.2</a:t>
+            </a:r>
+          </a:p>
+        </p:txBody>
+      </p:sp>
+      <p:sp>
+        <p:nvSpPr>
+          <p:cNvPr id="73" name="TextBox 72">
+            <a:extLst>
+              <a:ext uri="{FF2B5EF4-FFF2-40B4-BE49-F238E27FC236}">
+                <a16:creationId xmlns:a16="http://schemas.microsoft.com/office/drawing/2014/main" id="{9CD4F8F5-E10F-4EAA-A064-97B66AF90BE4}"/>
+              </a:ext>
+            </a:extLst>
+          </p:cNvPr>
+          <p:cNvSpPr txBox="1"/>
+          <p:nvPr/>
+        </p:nvSpPr>
+        <p:spPr>
+          <a:xfrm>
+            <a:off x="6026224" y="6212141"/>
+            <a:ext cx="2404379" cy="261610"/>
+          </a:xfrm>
+          <a:prstGeom prst="rect">
+            <a:avLst/>
+          </a:prstGeom>
+          <a:noFill/>
+        </p:spPr>
+        <p:txBody>
+          <a:bodyPr wrap="square" rtlCol="0">
+            <a:spAutoFit/>
+          </a:bodyPr>
+          <a:lstStyle/>
+          <a:p>
+            <a:r>
+              <a:rPr lang="en-US" sz="1100" dirty="0"/>
+              <a:t>Occurs at : 1/20/2010 4:30pm EST</a:t>
+            </a:r>
+          </a:p>
+        </p:txBody>
+      </p:sp>
+      <p:sp>
+        <p:nvSpPr>
+          <p:cNvPr id="93" name="TextBox 92">
+            <a:extLst>
+              <a:ext uri="{FF2B5EF4-FFF2-40B4-BE49-F238E27FC236}">
+                <a16:creationId xmlns:a16="http://schemas.microsoft.com/office/drawing/2014/main" id="{672EE3A9-EEA3-4525-8A33-475F991CDB13}"/>
+              </a:ext>
+            </a:extLst>
+          </p:cNvPr>
+          <p:cNvSpPr txBox="1"/>
+          <p:nvPr/>
+        </p:nvSpPr>
+        <p:spPr>
+          <a:xfrm>
+            <a:off x="2152027" y="4267987"/>
+            <a:ext cx="2338512" cy="261610"/>
+          </a:xfrm>
+          <a:prstGeom prst="rect">
+            <a:avLst/>
+          </a:prstGeom>
+          <a:noFill/>
+        </p:spPr>
+        <p:txBody>
+          <a:bodyPr wrap="square" rtlCol="0">
+            <a:spAutoFit/>
+          </a:bodyPr>
+          <a:lstStyle/>
+          <a:p>
+            <a:r>
+              <a:rPr lang="en-US" sz="1100" dirty="0"/>
+              <a:t>Occurs at: 1/20/2010 4:30pm EST</a:t>
+            </a:r>
+          </a:p>
+        </p:txBody>
+      </p:sp>
+      <p:sp>
+        <p:nvSpPr>
+          <p:cNvPr id="94" name="TextBox 93">
+            <a:extLst>
+              <a:ext uri="{FF2B5EF4-FFF2-40B4-BE49-F238E27FC236}">
+                <a16:creationId xmlns:a16="http://schemas.microsoft.com/office/drawing/2014/main" id="{63B96D5D-050B-4FB8-905C-26129F789A39}"/>
+              </a:ext>
+            </a:extLst>
+          </p:cNvPr>
+          <p:cNvSpPr txBox="1"/>
+          <p:nvPr/>
+        </p:nvSpPr>
+        <p:spPr>
+          <a:xfrm>
+            <a:off x="10785697" y="5211608"/>
+            <a:ext cx="896591" cy="307777"/>
+          </a:xfrm>
+          <a:prstGeom prst="rect">
+            <a:avLst/>
+          </a:prstGeom>
+          <a:noFill/>
+        </p:spPr>
+        <p:txBody>
+          <a:bodyPr wrap="square" rtlCol="0">
+            <a:spAutoFit/>
+          </a:bodyPr>
+          <a:lstStyle/>
+          <a:p>
+            <a:r>
+              <a:rPr lang="en-US" sz="1400" dirty="0"/>
+              <a:t>Body site</a:t>
+            </a:r>
+          </a:p>
+        </p:txBody>
+      </p:sp>
+      <p:sp>
+        <p:nvSpPr>
+          <p:cNvPr id="95" name="TextBox 94">
+            <a:extLst>
+              <a:ext uri="{FF2B5EF4-FFF2-40B4-BE49-F238E27FC236}">
+                <a16:creationId xmlns:a16="http://schemas.microsoft.com/office/drawing/2014/main" id="{90CC8662-7F82-4C98-8D7B-7A912A572DC0}"/>
+              </a:ext>
+            </a:extLst>
+          </p:cNvPr>
+          <p:cNvSpPr txBox="1"/>
+          <p:nvPr/>
+        </p:nvSpPr>
+        <p:spPr>
+          <a:xfrm rot="16200000">
+            <a:off x="4199782" y="4314179"/>
+            <a:ext cx="1073922" cy="307777"/>
+          </a:xfrm>
+          <a:prstGeom prst="rect">
+            <a:avLst/>
+          </a:prstGeom>
+          <a:noFill/>
+        </p:spPr>
+        <p:txBody>
+          <a:bodyPr wrap="square" rtlCol="0">
+            <a:spAutoFit/>
+          </a:bodyPr>
+          <a:lstStyle/>
+          <a:p>
+            <a:r>
+              <a:rPr lang="en-US" sz="1400" dirty="0"/>
+              <a:t>Is subject of</a:t>
+            </a:r>
+          </a:p>
+        </p:txBody>
+      </p:sp>
+      <p:sp>
+        <p:nvSpPr>
+          <p:cNvPr id="104" name="Rectangle 103">
+            <a:extLst>
+              <a:ext uri="{FF2B5EF4-FFF2-40B4-BE49-F238E27FC236}">
+                <a16:creationId xmlns:a16="http://schemas.microsoft.com/office/drawing/2014/main" id="{CD529508-5E66-4929-AA30-F44E9A9A30C1}"/>
+              </a:ext>
+            </a:extLst>
+          </p:cNvPr>
+          <p:cNvSpPr/>
+          <p:nvPr/>
+        </p:nvSpPr>
+        <p:spPr>
+          <a:xfrm>
+            <a:off x="0" y="5028193"/>
+            <a:ext cx="2309091" cy="1706487"/>
+          </a:xfrm>
+          <a:prstGeom prst="rect">
+            <a:avLst/>
+          </a:prstGeom>
+          <a:solidFill>
+            <a:schemeClr val="accent1">
+              <a:lumMod val="20000"/>
+              <a:lumOff val="80000"/>
+            </a:schemeClr>
+          </a:solidFill>
+        </p:spPr>
+        <p:style>
+          <a:lnRef idx="2">
+            <a:schemeClr val="accent1">
+              <a:shade val="50000"/>
+            </a:schemeClr>
+          </a:lnRef>
+          <a:fillRef idx="1">
+            <a:schemeClr val="accent1"/>
+          </a:fillRef>
+          <a:effectRef idx="0">
+            <a:schemeClr val="accent1"/>
+          </a:effectRef>
+          <a:fontRef idx="minor">
+            <a:schemeClr val="lt1"/>
+          </a:fontRef>
+        </p:style>
+        <p:txBody>
+          <a:bodyPr rtlCol="0" anchor="ctr"/>
+          <a:lstStyle/>
+          <a:p>
+            <a:pPr algn="ctr"/>
+            <a:endParaRPr lang="en-US"/>
+          </a:p>
+        </p:txBody>
+      </p:sp>
+      <p:sp>
+        <p:nvSpPr>
+          <p:cNvPr id="105" name="Oval 104">
+            <a:extLst>
+              <a:ext uri="{FF2B5EF4-FFF2-40B4-BE49-F238E27FC236}">
+                <a16:creationId xmlns:a16="http://schemas.microsoft.com/office/drawing/2014/main" id="{7548FB87-A04C-4F28-80F2-FC29035D16BA}"/>
+              </a:ext>
+            </a:extLst>
+          </p:cNvPr>
+          <p:cNvSpPr/>
+          <p:nvPr/>
+        </p:nvSpPr>
+        <p:spPr>
+          <a:xfrm>
+            <a:off x="55745" y="5099347"/>
+            <a:ext cx="2162729" cy="1081980"/>
+          </a:xfrm>
+          <a:prstGeom prst="ellipse">
+            <a:avLst/>
+          </a:prstGeom>
+        </p:spPr>
+        <p:style>
+          <a:lnRef idx="2">
+            <a:schemeClr val="accent1">
+              <a:shade val="50000"/>
+            </a:schemeClr>
+          </a:lnRef>
+          <a:fillRef idx="1">
+            <a:schemeClr val="accent1"/>
+          </a:fillRef>
+          <a:effectRef idx="0">
+            <a:schemeClr val="accent1"/>
+          </a:effectRef>
+          <a:fontRef idx="minor">
+            <a:schemeClr val="lt1"/>
+          </a:fontRef>
+        </p:style>
+        <p:txBody>
+          <a:bodyPr wrap="square" rtlCol="0" anchor="ctr">
+            <a:spAutoFit/>
+          </a:bodyPr>
+          <a:lstStyle/>
+          <a:p>
+            <a:pPr algn="ctr"/>
+            <a:r>
+              <a:rPr lang="en-US" sz="1600" dirty="0"/>
+              <a:t>Measurement Activity</a:t>
+            </a:r>
+          </a:p>
+          <a:p>
+            <a:pPr algn="ctr"/>
+            <a:r>
+              <a:rPr lang="en-US" sz="1200" dirty="0"/>
+              <a:t>(Observation Activity)</a:t>
+            </a:r>
+          </a:p>
+        </p:txBody>
+      </p:sp>
+      <p:sp>
+        <p:nvSpPr>
+          <p:cNvPr id="106" name="TextBox 105">
+            <a:extLst>
+              <a:ext uri="{FF2B5EF4-FFF2-40B4-BE49-F238E27FC236}">
+                <a16:creationId xmlns:a16="http://schemas.microsoft.com/office/drawing/2014/main" id="{48999265-1647-430D-AAAF-D025973439F6}"/>
+              </a:ext>
+            </a:extLst>
+          </p:cNvPr>
+          <p:cNvSpPr txBox="1"/>
+          <p:nvPr/>
+        </p:nvSpPr>
+        <p:spPr>
+          <a:xfrm>
+            <a:off x="67451" y="6309919"/>
+            <a:ext cx="2174187" cy="600164"/>
+          </a:xfrm>
+          <a:prstGeom prst="rect">
+            <a:avLst/>
+          </a:prstGeom>
+          <a:noFill/>
+        </p:spPr>
+        <p:txBody>
+          <a:bodyPr wrap="square" rtlCol="0">
+            <a:spAutoFit/>
+          </a:bodyPr>
+          <a:lstStyle/>
+          <a:p>
+            <a:r>
+              <a:rPr lang="en-US" sz="1100" dirty="0"/>
+              <a:t>Start time: 1/20/2010 4:25pm EST</a:t>
+            </a:r>
+          </a:p>
+          <a:p>
+            <a:r>
+              <a:rPr lang="en-US" sz="1100" dirty="0"/>
+              <a:t>End time: 1/20/2010 4:30pm EST</a:t>
+            </a:r>
+          </a:p>
+          <a:p>
+            <a:endParaRPr lang="en-US" sz="1100" dirty="0"/>
+          </a:p>
+        </p:txBody>
+      </p:sp>
+      <p:cxnSp>
+        <p:nvCxnSpPr>
+          <p:cNvPr id="111" name="Connector: Curved 110">
+            <a:extLst>
+              <a:ext uri="{FF2B5EF4-FFF2-40B4-BE49-F238E27FC236}">
+                <a16:creationId xmlns:a16="http://schemas.microsoft.com/office/drawing/2014/main" id="{907A8CEF-7DCD-4E23-A47C-B1B6C810C80A}"/>
+              </a:ext>
+            </a:extLst>
+          </p:cNvPr>
+          <p:cNvCxnSpPr>
+            <a:cxnSpLocks/>
+            <a:stCxn id="104" idx="0"/>
+            <a:endCxn id="49" idx="1"/>
+          </p:cNvCxnSpPr>
+          <p:nvPr/>
+        </p:nvCxnSpPr>
+        <p:spPr>
+          <a:xfrm rot="5400000" flipH="1" flipV="1">
+            <a:off x="1028154" y="4020941"/>
+            <a:ext cx="1133645" cy="880861"/>
+          </a:xfrm>
+          <a:prstGeom prst="curvedConnector2">
+            <a:avLst/>
+          </a:prstGeom>
+          <a:ln>
+            <a:tailEnd type="triangle"/>
+          </a:ln>
+        </p:spPr>
+        <p:style>
+          <a:lnRef idx="1">
+            <a:schemeClr val="accent1"/>
+          </a:lnRef>
+          <a:fillRef idx="0">
+            <a:schemeClr val="accent1"/>
+          </a:fillRef>
+          <a:effectRef idx="0">
+            <a:schemeClr val="accent1"/>
+          </a:effectRef>
+          <a:fontRef idx="minor">
+            <a:schemeClr val="tx1"/>
+          </a:fontRef>
+        </p:style>
+      </p:cxnSp>
+      <p:sp>
+        <p:nvSpPr>
+          <p:cNvPr id="116" name="TextBox 115">
+            <a:extLst>
+              <a:ext uri="{FF2B5EF4-FFF2-40B4-BE49-F238E27FC236}">
+                <a16:creationId xmlns:a16="http://schemas.microsoft.com/office/drawing/2014/main" id="{14FF77E0-988B-4C0D-9001-C7070A863EE9}"/>
+              </a:ext>
+            </a:extLst>
+          </p:cNvPr>
+          <p:cNvSpPr txBox="1"/>
+          <p:nvPr/>
+        </p:nvSpPr>
+        <p:spPr>
+          <a:xfrm rot="19694836">
+            <a:off x="1115803" y="3801974"/>
+            <a:ext cx="992921" cy="307777"/>
+          </a:xfrm>
+          <a:prstGeom prst="rect">
+            <a:avLst/>
+          </a:prstGeom>
+          <a:noFill/>
+        </p:spPr>
+        <p:txBody>
+          <a:bodyPr wrap="square" rtlCol="0">
+            <a:spAutoFit/>
+          </a:bodyPr>
+          <a:lstStyle/>
+          <a:p>
+            <a:r>
+              <a:rPr lang="en-US" sz="1400" dirty="0"/>
+              <a:t>Results in</a:t>
+            </a:r>
+          </a:p>
+        </p:txBody>
+      </p:sp>
+      <p:sp>
+        <p:nvSpPr>
+          <p:cNvPr id="118" name="TextBox 117">
+            <a:extLst>
+              <a:ext uri="{FF2B5EF4-FFF2-40B4-BE49-F238E27FC236}">
+                <a16:creationId xmlns:a16="http://schemas.microsoft.com/office/drawing/2014/main" id="{86EDB684-3211-4F23-8BA3-CE86DF16F5E3}"/>
+              </a:ext>
+            </a:extLst>
+          </p:cNvPr>
+          <p:cNvSpPr txBox="1"/>
+          <p:nvPr/>
+        </p:nvSpPr>
+        <p:spPr>
+          <a:xfrm>
+            <a:off x="1178752" y="4740594"/>
+            <a:ext cx="1267368" cy="307777"/>
+          </a:xfrm>
+          <a:prstGeom prst="rect">
+            <a:avLst/>
+          </a:prstGeom>
+          <a:noFill/>
+        </p:spPr>
+        <p:txBody>
+          <a:bodyPr wrap="square" rtlCol="0">
+            <a:spAutoFit/>
+          </a:bodyPr>
+          <a:lstStyle/>
+          <a:p>
+            <a:r>
+              <a:rPr lang="en-US" sz="1400" dirty="0"/>
+              <a:t>Results from</a:t>
+            </a:r>
+          </a:p>
+        </p:txBody>
+      </p:sp>
+      <p:sp>
+        <p:nvSpPr>
+          <p:cNvPr id="138" name="Rectangle 137">
+            <a:extLst>
+              <a:ext uri="{FF2B5EF4-FFF2-40B4-BE49-F238E27FC236}">
+                <a16:creationId xmlns:a16="http://schemas.microsoft.com/office/drawing/2014/main" id="{8EBE04DF-B4C0-4632-B44C-5632BED8BE0C}"/>
+              </a:ext>
+            </a:extLst>
+          </p:cNvPr>
+          <p:cNvSpPr/>
+          <p:nvPr/>
+        </p:nvSpPr>
+        <p:spPr>
+          <a:xfrm>
+            <a:off x="132674" y="933716"/>
+            <a:ext cx="2557181" cy="1699898"/>
+          </a:xfrm>
+          <a:prstGeom prst="rect">
+            <a:avLst/>
+          </a:prstGeom>
+          <a:solidFill>
+            <a:schemeClr val="accent1">
+              <a:lumMod val="20000"/>
+              <a:lumOff val="80000"/>
+            </a:schemeClr>
+          </a:solidFill>
+        </p:spPr>
+        <p:style>
+          <a:lnRef idx="2">
+            <a:schemeClr val="accent1">
+              <a:shade val="50000"/>
+            </a:schemeClr>
+          </a:lnRef>
+          <a:fillRef idx="1">
+            <a:schemeClr val="accent1"/>
+          </a:fillRef>
+          <a:effectRef idx="0">
+            <a:schemeClr val="accent1"/>
+          </a:effectRef>
+          <a:fontRef idx="minor">
+            <a:schemeClr val="lt1"/>
+          </a:fontRef>
+        </p:style>
+        <p:txBody>
+          <a:bodyPr rtlCol="0" anchor="ctr"/>
+          <a:lstStyle/>
+          <a:p>
+            <a:pPr algn="ctr"/>
+            <a:endParaRPr lang="en-US"/>
+          </a:p>
+        </p:txBody>
+      </p:sp>
+      <p:sp>
+        <p:nvSpPr>
+          <p:cNvPr id="139" name="Oval 138">
+            <a:extLst>
+              <a:ext uri="{FF2B5EF4-FFF2-40B4-BE49-F238E27FC236}">
+                <a16:creationId xmlns:a16="http://schemas.microsoft.com/office/drawing/2014/main" id="{5C008523-FB5A-4146-A1E8-B40647EA44E8}"/>
+              </a:ext>
+            </a:extLst>
+          </p:cNvPr>
+          <p:cNvSpPr/>
+          <p:nvPr/>
+        </p:nvSpPr>
+        <p:spPr>
+          <a:xfrm>
+            <a:off x="309379" y="1222808"/>
+            <a:ext cx="2165800" cy="670828"/>
+          </a:xfrm>
+          <a:prstGeom prst="ellipse">
+            <a:avLst/>
+          </a:prstGeom>
+        </p:spPr>
+        <p:style>
+          <a:lnRef idx="2">
+            <a:schemeClr val="accent1">
+              <a:shade val="50000"/>
+            </a:schemeClr>
+          </a:lnRef>
+          <a:fillRef idx="1">
+            <a:schemeClr val="accent1"/>
+          </a:fillRef>
+          <a:effectRef idx="0">
+            <a:schemeClr val="accent1"/>
+          </a:effectRef>
+          <a:fontRef idx="minor">
+            <a:schemeClr val="lt1"/>
+          </a:fontRef>
+        </p:style>
+        <p:txBody>
+          <a:bodyPr wrap="square" rtlCol="0" anchor="ctr">
+            <a:spAutoFit/>
+          </a:bodyPr>
+          <a:lstStyle/>
+          <a:p>
+            <a:pPr algn="ctr"/>
+            <a:r>
+              <a:rPr lang="en-US" sz="1400" dirty="0"/>
+              <a:t>Encounter</a:t>
+            </a:r>
+          </a:p>
+          <a:p>
+            <a:pPr algn="ctr"/>
+            <a:r>
+              <a:rPr lang="en-US" sz="1100" dirty="0"/>
+              <a:t>(Clinical Activity)</a:t>
+            </a:r>
+          </a:p>
+        </p:txBody>
+      </p:sp>
+      <p:sp>
+        <p:nvSpPr>
+          <p:cNvPr id="140" name="TextBox 139">
+            <a:extLst>
+              <a:ext uri="{FF2B5EF4-FFF2-40B4-BE49-F238E27FC236}">
+                <a16:creationId xmlns:a16="http://schemas.microsoft.com/office/drawing/2014/main" id="{246BB615-DE75-4147-908E-86B7C9C896B3}"/>
+              </a:ext>
+            </a:extLst>
+          </p:cNvPr>
+          <p:cNvSpPr txBox="1"/>
+          <p:nvPr/>
+        </p:nvSpPr>
+        <p:spPr>
+          <a:xfrm>
+            <a:off x="403122" y="2033912"/>
+            <a:ext cx="2234745" cy="600164"/>
+          </a:xfrm>
+          <a:prstGeom prst="rect">
+            <a:avLst/>
+          </a:prstGeom>
+          <a:noFill/>
+        </p:spPr>
+        <p:txBody>
+          <a:bodyPr wrap="square" rtlCol="0">
+            <a:spAutoFit/>
+          </a:bodyPr>
+          <a:lstStyle/>
+          <a:p>
+            <a:r>
+              <a:rPr lang="en-US" sz="1100" dirty="0"/>
+              <a:t>Start time: 1/20/2010 1:20pm EST</a:t>
+            </a:r>
+          </a:p>
+          <a:p>
+            <a:r>
+              <a:rPr lang="en-US" sz="1100" dirty="0"/>
+              <a:t>End time: 1/20/2010 5:20pm EST</a:t>
+            </a:r>
+          </a:p>
+          <a:p>
+            <a:endParaRPr lang="en-US" sz="1100" dirty="0"/>
+          </a:p>
+        </p:txBody>
+      </p:sp>
+      <p:cxnSp>
+        <p:nvCxnSpPr>
+          <p:cNvPr id="160" name="Connector: Curved 159">
+            <a:extLst>
+              <a:ext uri="{FF2B5EF4-FFF2-40B4-BE49-F238E27FC236}">
+                <a16:creationId xmlns:a16="http://schemas.microsoft.com/office/drawing/2014/main" id="{43F7DF75-16DC-4BF5-A151-C2A64DB769A2}"/>
+              </a:ext>
+            </a:extLst>
+          </p:cNvPr>
+          <p:cNvCxnSpPr>
+            <a:cxnSpLocks/>
+            <a:stCxn id="138" idx="3"/>
+            <a:endCxn id="8" idx="2"/>
+          </p:cNvCxnSpPr>
+          <p:nvPr/>
+        </p:nvCxnSpPr>
+        <p:spPr>
+          <a:xfrm flipV="1">
+            <a:off x="2689855" y="1714657"/>
+            <a:ext cx="2425797" cy="69008"/>
+          </a:xfrm>
+          <a:prstGeom prst="curvedConnector3">
+            <a:avLst>
+              <a:gd name="adj1" fmla="val 50000"/>
+            </a:avLst>
+          </a:prstGeom>
+          <a:ln>
+            <a:tailEnd type="triangle"/>
+          </a:ln>
+        </p:spPr>
+        <p:style>
+          <a:lnRef idx="1">
+            <a:schemeClr val="accent1"/>
+          </a:lnRef>
+          <a:fillRef idx="0">
+            <a:schemeClr val="accent1"/>
+          </a:fillRef>
+          <a:effectRef idx="0">
+            <a:schemeClr val="accent1"/>
+          </a:effectRef>
+          <a:fontRef idx="minor">
+            <a:schemeClr val="tx1"/>
+          </a:fontRef>
+        </p:style>
+      </p:cxnSp>
+      <p:sp>
+        <p:nvSpPr>
+          <p:cNvPr id="163" name="TextBox 162">
+            <a:extLst>
+              <a:ext uri="{FF2B5EF4-FFF2-40B4-BE49-F238E27FC236}">
+                <a16:creationId xmlns:a16="http://schemas.microsoft.com/office/drawing/2014/main" id="{D3D76259-84D5-4D68-A1C3-A478EE349400}"/>
+              </a:ext>
+            </a:extLst>
+          </p:cNvPr>
+          <p:cNvSpPr txBox="1"/>
+          <p:nvPr/>
+        </p:nvSpPr>
+        <p:spPr>
+          <a:xfrm>
+            <a:off x="4421756" y="1203651"/>
+            <a:ext cx="896591" cy="523220"/>
+          </a:xfrm>
+          <a:prstGeom prst="rect">
+            <a:avLst/>
+          </a:prstGeom>
+          <a:noFill/>
+        </p:spPr>
+        <p:txBody>
+          <a:bodyPr wrap="square" rtlCol="0">
+            <a:spAutoFit/>
+          </a:bodyPr>
+          <a:lstStyle/>
+          <a:p>
+            <a:r>
+              <a:rPr lang="en-US" sz="1400" dirty="0"/>
+              <a:t>Has care subject</a:t>
+            </a:r>
+          </a:p>
+        </p:txBody>
+      </p:sp>
+      <p:cxnSp>
+        <p:nvCxnSpPr>
+          <p:cNvPr id="164" name="Connector: Curved 163">
+            <a:extLst>
+              <a:ext uri="{FF2B5EF4-FFF2-40B4-BE49-F238E27FC236}">
+                <a16:creationId xmlns:a16="http://schemas.microsoft.com/office/drawing/2014/main" id="{167E5287-8B63-4110-A8F1-CC0DF8A9DE6A}"/>
+              </a:ext>
+            </a:extLst>
+          </p:cNvPr>
+          <p:cNvCxnSpPr>
+            <a:cxnSpLocks/>
+            <a:stCxn id="138" idx="2"/>
+          </p:cNvCxnSpPr>
+          <p:nvPr/>
+        </p:nvCxnSpPr>
+        <p:spPr>
+          <a:xfrm rot="5400000">
+            <a:off x="-285862" y="3351243"/>
+            <a:ext cx="2414757" cy="979498"/>
+          </a:xfrm>
+          <a:prstGeom prst="curvedConnector3">
+            <a:avLst>
+              <a:gd name="adj1" fmla="val 50000"/>
+            </a:avLst>
+          </a:prstGeom>
+          <a:ln>
+            <a:tailEnd type="triangle"/>
+          </a:ln>
+        </p:spPr>
+        <p:style>
+          <a:lnRef idx="1">
+            <a:schemeClr val="accent1"/>
+          </a:lnRef>
+          <a:fillRef idx="0">
+            <a:schemeClr val="accent1"/>
+          </a:fillRef>
+          <a:effectRef idx="0">
+            <a:schemeClr val="accent1"/>
+          </a:effectRef>
+          <a:fontRef idx="minor">
+            <a:schemeClr val="tx1"/>
+          </a:fontRef>
+        </p:style>
+      </p:cxnSp>
+      <p:sp>
+        <p:nvSpPr>
+          <p:cNvPr id="168" name="TextBox 167">
+            <a:extLst>
+              <a:ext uri="{FF2B5EF4-FFF2-40B4-BE49-F238E27FC236}">
+                <a16:creationId xmlns:a16="http://schemas.microsoft.com/office/drawing/2014/main" id="{479D6AB6-2742-4252-B600-9AB9C87F293F}"/>
+              </a:ext>
+            </a:extLst>
+          </p:cNvPr>
+          <p:cNvSpPr txBox="1"/>
+          <p:nvPr/>
+        </p:nvSpPr>
+        <p:spPr>
+          <a:xfrm>
+            <a:off x="132674" y="3383241"/>
+            <a:ext cx="992921" cy="738664"/>
+          </a:xfrm>
+          <a:prstGeom prst="rect">
+            <a:avLst/>
+          </a:prstGeom>
+          <a:noFill/>
+        </p:spPr>
+        <p:txBody>
+          <a:bodyPr wrap="square" rtlCol="0">
+            <a:spAutoFit/>
+          </a:bodyPr>
+          <a:lstStyle/>
+          <a:p>
+            <a:r>
+              <a:rPr lang="en-US" sz="1400" dirty="0"/>
+              <a:t>Has temporal part</a:t>
+            </a:r>
+          </a:p>
+        </p:txBody>
+      </p:sp>
+      <p:cxnSp>
+        <p:nvCxnSpPr>
+          <p:cNvPr id="172" name="Connector: Curved 171">
+            <a:extLst>
+              <a:ext uri="{FF2B5EF4-FFF2-40B4-BE49-F238E27FC236}">
+                <a16:creationId xmlns:a16="http://schemas.microsoft.com/office/drawing/2014/main" id="{DD461550-93F7-49BC-B46B-0041B79576D2}"/>
+              </a:ext>
+            </a:extLst>
+          </p:cNvPr>
+          <p:cNvCxnSpPr>
+            <a:cxnSpLocks/>
+            <a:stCxn id="49" idx="3"/>
+            <a:endCxn id="47" idx="1"/>
+          </p:cNvCxnSpPr>
+          <p:nvPr/>
+        </p:nvCxnSpPr>
+        <p:spPr>
+          <a:xfrm>
+            <a:off x="4592588" y="3894548"/>
+            <a:ext cx="1444652" cy="1754930"/>
+          </a:xfrm>
+          <a:prstGeom prst="curvedConnector3">
+            <a:avLst>
+              <a:gd name="adj1" fmla="val 50000"/>
+            </a:avLst>
+          </a:prstGeom>
+          <a:ln>
+            <a:tailEnd type="triangle"/>
+          </a:ln>
+        </p:spPr>
+        <p:style>
+          <a:lnRef idx="1">
+            <a:schemeClr val="accent1"/>
+          </a:lnRef>
+          <a:fillRef idx="0">
+            <a:schemeClr val="accent1"/>
+          </a:fillRef>
+          <a:effectRef idx="0">
+            <a:schemeClr val="accent1"/>
+          </a:effectRef>
+          <a:fontRef idx="minor">
+            <a:schemeClr val="tx1"/>
+          </a:fontRef>
+        </p:style>
+      </p:cxnSp>
+      <p:cxnSp>
+        <p:nvCxnSpPr>
+          <p:cNvPr id="186" name="Connector: Curved 185">
+            <a:extLst>
+              <a:ext uri="{FF2B5EF4-FFF2-40B4-BE49-F238E27FC236}">
+                <a16:creationId xmlns:a16="http://schemas.microsoft.com/office/drawing/2014/main" id="{8D9F1382-FA76-49BA-B3C6-E1C8250B6F6A}"/>
+              </a:ext>
+            </a:extLst>
+          </p:cNvPr>
+          <p:cNvCxnSpPr>
+            <a:cxnSpLocks/>
+            <a:stCxn id="138" idx="3"/>
+            <a:endCxn id="190" idx="0"/>
+          </p:cNvCxnSpPr>
+          <p:nvPr/>
+        </p:nvCxnSpPr>
+        <p:spPr>
+          <a:xfrm>
+            <a:off x="2689855" y="1783665"/>
+            <a:ext cx="3825885" cy="2516115"/>
+          </a:xfrm>
+          <a:prstGeom prst="curvedConnector2">
+            <a:avLst/>
+          </a:prstGeom>
+          <a:ln>
+            <a:tailEnd type="triangle"/>
+          </a:ln>
+        </p:spPr>
+        <p:style>
+          <a:lnRef idx="1">
+            <a:schemeClr val="accent1"/>
+          </a:lnRef>
+          <a:fillRef idx="0">
+            <a:schemeClr val="accent1"/>
+          </a:fillRef>
+          <a:effectRef idx="0">
+            <a:schemeClr val="accent1"/>
+          </a:effectRef>
+          <a:fontRef idx="minor">
+            <a:schemeClr val="tx1"/>
+          </a:fontRef>
+        </p:style>
+      </p:cxnSp>
+      <p:sp>
+        <p:nvSpPr>
+          <p:cNvPr id="190" name="TextBox 189">
+            <a:extLst>
+              <a:ext uri="{FF2B5EF4-FFF2-40B4-BE49-F238E27FC236}">
+                <a16:creationId xmlns:a16="http://schemas.microsoft.com/office/drawing/2014/main" id="{A2A0D61F-538C-4228-8B94-A1BCDEC708AA}"/>
+              </a:ext>
+            </a:extLst>
+          </p:cNvPr>
+          <p:cNvSpPr txBox="1"/>
+          <p:nvPr/>
+        </p:nvSpPr>
+        <p:spPr>
+          <a:xfrm>
+            <a:off x="5955600" y="4299780"/>
+            <a:ext cx="1120280" cy="307777"/>
+          </a:xfrm>
+          <a:prstGeom prst="rect">
+            <a:avLst/>
+          </a:prstGeom>
+          <a:noFill/>
+        </p:spPr>
+        <p:txBody>
+          <a:bodyPr wrap="square" rtlCol="0">
+            <a:spAutoFit/>
+          </a:bodyPr>
+          <a:lstStyle/>
+          <a:p>
+            <a:r>
+              <a:rPr lang="en-US" sz="1400" dirty="0"/>
+              <a:t>Has relevant</a:t>
+            </a:r>
+          </a:p>
+        </p:txBody>
+      </p:sp>
+      <p:sp>
+        <p:nvSpPr>
+          <p:cNvPr id="197" name="Oval 196">
+            <a:extLst>
+              <a:ext uri="{FF2B5EF4-FFF2-40B4-BE49-F238E27FC236}">
+                <a16:creationId xmlns:a16="http://schemas.microsoft.com/office/drawing/2014/main" id="{95214143-4C3C-4130-982C-88B692D5DABB}"/>
+              </a:ext>
+            </a:extLst>
+          </p:cNvPr>
+          <p:cNvSpPr/>
+          <p:nvPr/>
+        </p:nvSpPr>
+        <p:spPr>
+          <a:xfrm>
+            <a:off x="7027366" y="2754715"/>
+            <a:ext cx="1434642" cy="389513"/>
+          </a:xfrm>
+          <a:prstGeom prst="ellipse">
+            <a:avLst/>
+          </a:prstGeom>
+        </p:spPr>
+        <p:style>
+          <a:lnRef idx="2">
+            <a:schemeClr val="accent1">
+              <a:shade val="50000"/>
+            </a:schemeClr>
+          </a:lnRef>
+          <a:fillRef idx="1">
+            <a:schemeClr val="accent1"/>
+          </a:fillRef>
+          <a:effectRef idx="0">
+            <a:schemeClr val="accent1"/>
+          </a:effectRef>
+          <a:fontRef idx="minor">
+            <a:schemeClr val="lt1"/>
+          </a:fontRef>
+        </p:style>
+        <p:txBody>
+          <a:bodyPr wrap="square" rtlCol="0" anchor="ctr">
+            <a:spAutoFit/>
+          </a:bodyPr>
+          <a:lstStyle/>
+          <a:p>
+            <a:pPr algn="ctr"/>
+            <a:r>
+              <a:rPr lang="en-US" sz="1200" dirty="0"/>
+              <a:t>Has vital sign</a:t>
+            </a:r>
+          </a:p>
+        </p:txBody>
+      </p:sp>
+      <p:cxnSp>
+        <p:nvCxnSpPr>
+          <p:cNvPr id="204" name="Connector: Curved 203">
+            <a:extLst>
+              <a:ext uri="{FF2B5EF4-FFF2-40B4-BE49-F238E27FC236}">
+                <a16:creationId xmlns:a16="http://schemas.microsoft.com/office/drawing/2014/main" id="{CE15371E-9C24-4947-945F-71A9D4292DBF}"/>
+              </a:ext>
+            </a:extLst>
+          </p:cNvPr>
+          <p:cNvCxnSpPr>
+            <a:cxnSpLocks/>
+          </p:cNvCxnSpPr>
+          <p:nvPr/>
+        </p:nvCxnSpPr>
+        <p:spPr>
+          <a:xfrm>
+            <a:off x="2318825" y="5155482"/>
+            <a:ext cx="3670774" cy="849949"/>
+          </a:xfrm>
+          <a:prstGeom prst="curvedConnector3">
+            <a:avLst>
+              <a:gd name="adj1" fmla="val 50000"/>
+            </a:avLst>
+          </a:prstGeom>
+          <a:ln>
+            <a:tailEnd type="triangle"/>
+          </a:ln>
+        </p:spPr>
+        <p:style>
+          <a:lnRef idx="1">
+            <a:schemeClr val="accent1"/>
+          </a:lnRef>
+          <a:fillRef idx="0">
+            <a:schemeClr val="accent1"/>
+          </a:fillRef>
+          <a:effectRef idx="0">
+            <a:schemeClr val="accent1"/>
+          </a:effectRef>
+          <a:fontRef idx="minor">
+            <a:schemeClr val="tx1"/>
+          </a:fontRef>
+        </p:style>
+      </p:cxnSp>
+      <p:sp>
+        <p:nvSpPr>
+          <p:cNvPr id="206" name="TextBox 205">
+            <a:extLst>
+              <a:ext uri="{FF2B5EF4-FFF2-40B4-BE49-F238E27FC236}">
+                <a16:creationId xmlns:a16="http://schemas.microsoft.com/office/drawing/2014/main" id="{6954795C-1440-46AC-B449-6303FAA24307}"/>
+              </a:ext>
+            </a:extLst>
+          </p:cNvPr>
+          <p:cNvSpPr txBox="1"/>
+          <p:nvPr/>
+        </p:nvSpPr>
+        <p:spPr>
+          <a:xfrm>
+            <a:off x="5282613" y="5674447"/>
+            <a:ext cx="896591" cy="523220"/>
+          </a:xfrm>
+          <a:prstGeom prst="rect">
+            <a:avLst/>
+          </a:prstGeom>
+          <a:noFill/>
+        </p:spPr>
+        <p:txBody>
+          <a:bodyPr wrap="square" rtlCol="0">
+            <a:spAutoFit/>
+          </a:bodyPr>
+          <a:lstStyle/>
+          <a:p>
+            <a:r>
+              <a:rPr lang="en-US" sz="1400" dirty="0"/>
+              <a:t>Has finding</a:t>
+            </a:r>
+          </a:p>
+        </p:txBody>
+      </p:sp>
+      <p:sp>
+        <p:nvSpPr>
+          <p:cNvPr id="2" name="&quot;Not Allowed&quot; Symbol 1">
+            <a:extLst>
+              <a:ext uri="{FF2B5EF4-FFF2-40B4-BE49-F238E27FC236}">
+                <a16:creationId xmlns:a16="http://schemas.microsoft.com/office/drawing/2014/main" id="{0D4DD7A1-F58E-4EDD-B73B-F38F3E7FD0F0}"/>
+              </a:ext>
+            </a:extLst>
+          </p:cNvPr>
+          <p:cNvSpPr/>
+          <p:nvPr/>
+        </p:nvSpPr>
+        <p:spPr>
+          <a:xfrm>
+            <a:off x="2152027" y="3044599"/>
+            <a:ext cx="2388573" cy="1666166"/>
+          </a:xfrm>
+          <a:prstGeom prst="noSmoking">
+            <a:avLst/>
+          </a:prstGeom>
+          <a:solidFill>
+            <a:srgbClr val="FF0000">
+              <a:alpha val="34000"/>
+            </a:srgbClr>
+          </a:solidFill>
+        </p:spPr>
+        <p:style>
+          <a:lnRef idx="2">
+            <a:schemeClr val="accent1">
+              <a:shade val="50000"/>
+            </a:schemeClr>
+          </a:lnRef>
+          <a:fillRef idx="1">
+            <a:schemeClr val="accent1"/>
+          </a:fillRef>
+          <a:effectRef idx="0">
+            <a:schemeClr val="accent1"/>
+          </a:effectRef>
+          <a:fontRef idx="minor">
+            <a:schemeClr val="lt1"/>
+          </a:fontRef>
+        </p:style>
+        <p:txBody>
+          <a:bodyPr rtlCol="0" anchor="ctr"/>
+          <a:lstStyle/>
+          <a:p>
+            <a:pPr algn="ctr"/>
+            <a:endParaRPr lang="en-US">
+              <a:solidFill>
+                <a:schemeClr val="tx1"/>
+              </a:solidFill>
+            </a:endParaRPr>
+          </a:p>
+        </p:txBody>
+      </p:sp>
+    </p:spTree>
+    <p:extLst>
+      <p:ext uri="{BB962C8B-B14F-4D97-AF65-F5344CB8AC3E}">
+        <p14:creationId xmlns:p14="http://schemas.microsoft.com/office/powerpoint/2010/main" val="3693833615"/>
       </p:ext>
     </p:extLst>
   </p:cSld>

</xml_diff>